<commit_message>
Updates reu 3 mentoring
</commit_message>
<xml_diff>
--- a/explorer/mentoring/business_model_canvas_spanish.pptx
+++ b/explorer/mentoring/business_model_canvas_spanish.pptx
@@ -5,12 +5,15 @@
     <p:sldMasterId id="2147483681" r:id="rId4"/>
   </p:sldMasterIdLst>
   <p:notesMasterIdLst>
-    <p:notesMasterId r:id="rId8"/>
+    <p:notesMasterId r:id="rId11"/>
   </p:notesMasterIdLst>
   <p:sldIdLst>
     <p:sldId id="480" r:id="rId5"/>
     <p:sldId id="481" r:id="rId6"/>
     <p:sldId id="482" r:id="rId7"/>
+    <p:sldId id="483" r:id="rId8"/>
+    <p:sldId id="484" r:id="rId9"/>
+    <p:sldId id="485" r:id="rId10"/>
   </p:sldIdLst>
   <p:sldSz cx="12192000" cy="6858000"/>
   <p:notesSz cx="6858000" cy="9144000"/>
@@ -199,7 +202,7 @@
           <a:p>
             <a:fld id="{C8FFD48F-8719-40F2-B0CF-2A5A63C0F0B9}" type="datetimeFigureOut">
               <a:rPr lang="es-ES" smtClean="0"/>
-              <a:t>28/02/2025</a:t>
+              <a:t>10/03/2025</a:t>
             </a:fld>
             <a:endParaRPr lang="es-ES"/>
           </a:p>
@@ -766,6 +769,330 @@
 </p:notes>
 </file>
 
+<file path=ppt/notesSlides/notesSlide4.xml><?xml version="1.0" encoding="utf-8"?>
+<p:notes xmlns:a="http://schemas.openxmlformats.org/drawingml/2006/main" xmlns:r="http://schemas.openxmlformats.org/officeDocument/2006/relationships" xmlns:p="http://schemas.openxmlformats.org/presentationml/2006/main">
+  <p:cSld>
+    <p:spTree>
+      <p:nvGrpSpPr>
+        <p:cNvPr id="1" name="">
+          <a:extLst>
+            <a:ext uri="{FF2B5EF4-FFF2-40B4-BE49-F238E27FC236}">
+              <a16:creationId xmlns:a16="http://schemas.microsoft.com/office/drawing/2014/main" id="{768C4694-BE33-A133-D161-BA9ECA44D553}"/>
+            </a:ext>
+          </a:extLst>
+        </p:cNvPr>
+        <p:cNvGrpSpPr/>
+        <p:nvPr/>
+      </p:nvGrpSpPr>
+      <p:grpSpPr>
+        <a:xfrm>
+          <a:off x="0" y="0"/>
+          <a:ext cx="0" cy="0"/>
+          <a:chOff x="0" y="0"/>
+          <a:chExt cx="0" cy="0"/>
+        </a:xfrm>
+      </p:grpSpPr>
+      <p:sp>
+        <p:nvSpPr>
+          <p:cNvPr id="2" name="Slide Image Placeholder 1">
+            <a:extLst>
+              <a:ext uri="{FF2B5EF4-FFF2-40B4-BE49-F238E27FC236}">
+                <a16:creationId xmlns:a16="http://schemas.microsoft.com/office/drawing/2014/main" id="{726C6A62-EB90-8463-9F02-8502A3DD5FAD}"/>
+              </a:ext>
+            </a:extLst>
+          </p:cNvPr>
+          <p:cNvSpPr>
+            <a:spLocks noGrp="1" noRot="1" noChangeAspect="1"/>
+          </p:cNvSpPr>
+          <p:nvPr>
+            <p:ph type="sldImg"/>
+          </p:nvPr>
+        </p:nvSpPr>
+        <p:spPr/>
+      </p:sp>
+      <p:sp>
+        <p:nvSpPr>
+          <p:cNvPr id="3" name="Notes Placeholder 2">
+            <a:extLst>
+              <a:ext uri="{FF2B5EF4-FFF2-40B4-BE49-F238E27FC236}">
+                <a16:creationId xmlns:a16="http://schemas.microsoft.com/office/drawing/2014/main" id="{0C6D7B4F-264F-9D9F-E6B9-8F08772AD19A}"/>
+              </a:ext>
+            </a:extLst>
+          </p:cNvPr>
+          <p:cNvSpPr>
+            <a:spLocks noGrp="1"/>
+          </p:cNvSpPr>
+          <p:nvPr>
+            <p:ph type="body" idx="1"/>
+          </p:nvPr>
+        </p:nvSpPr>
+        <p:spPr/>
+        <p:txBody>
+          <a:bodyPr/>
+          <a:lstStyle/>
+          <a:p>
+            <a:endParaRPr lang="en-GB" dirty="0"/>
+          </a:p>
+        </p:txBody>
+      </p:sp>
+      <p:sp>
+        <p:nvSpPr>
+          <p:cNvPr id="4" name="Slide Number Placeholder 3">
+            <a:extLst>
+              <a:ext uri="{FF2B5EF4-FFF2-40B4-BE49-F238E27FC236}">
+                <a16:creationId xmlns:a16="http://schemas.microsoft.com/office/drawing/2014/main" id="{CDF70E13-F24D-27F9-951B-2DCEB5E8587B}"/>
+              </a:ext>
+            </a:extLst>
+          </p:cNvPr>
+          <p:cNvSpPr>
+            <a:spLocks noGrp="1"/>
+          </p:cNvSpPr>
+          <p:nvPr>
+            <p:ph type="sldNum" sz="quarter" idx="5"/>
+          </p:nvPr>
+        </p:nvSpPr>
+        <p:spPr/>
+        <p:txBody>
+          <a:bodyPr/>
+          <a:lstStyle/>
+          <a:p>
+            <a:fld id="{D3A1C942-3B43-48F4-BEB8-B8FEBCDA6264}" type="slidenum">
+              <a:rPr lang="es-ES" smtClean="0"/>
+              <a:t>4</a:t>
+            </a:fld>
+            <a:endParaRPr lang="es-ES"/>
+          </a:p>
+        </p:txBody>
+      </p:sp>
+    </p:spTree>
+    <p:extLst>
+      <p:ext uri="{BB962C8B-B14F-4D97-AF65-F5344CB8AC3E}">
+        <p14:creationId xmlns:p14="http://schemas.microsoft.com/office/powerpoint/2010/main" val="3296982206"/>
+      </p:ext>
+    </p:extLst>
+  </p:cSld>
+  <p:clrMapOvr>
+    <a:masterClrMapping/>
+  </p:clrMapOvr>
+</p:notes>
+</file>
+
+<file path=ppt/notesSlides/notesSlide5.xml><?xml version="1.0" encoding="utf-8"?>
+<p:notes xmlns:a="http://schemas.openxmlformats.org/drawingml/2006/main" xmlns:r="http://schemas.openxmlformats.org/officeDocument/2006/relationships" xmlns:p="http://schemas.openxmlformats.org/presentationml/2006/main">
+  <p:cSld>
+    <p:spTree>
+      <p:nvGrpSpPr>
+        <p:cNvPr id="1" name="">
+          <a:extLst>
+            <a:ext uri="{FF2B5EF4-FFF2-40B4-BE49-F238E27FC236}">
+              <a16:creationId xmlns:a16="http://schemas.microsoft.com/office/drawing/2014/main" id="{8B2F1B44-0C90-423D-F38B-925546A7AF2B}"/>
+            </a:ext>
+          </a:extLst>
+        </p:cNvPr>
+        <p:cNvGrpSpPr/>
+        <p:nvPr/>
+      </p:nvGrpSpPr>
+      <p:grpSpPr>
+        <a:xfrm>
+          <a:off x="0" y="0"/>
+          <a:ext cx="0" cy="0"/>
+          <a:chOff x="0" y="0"/>
+          <a:chExt cx="0" cy="0"/>
+        </a:xfrm>
+      </p:grpSpPr>
+      <p:sp>
+        <p:nvSpPr>
+          <p:cNvPr id="2" name="Slide Image Placeholder 1">
+            <a:extLst>
+              <a:ext uri="{FF2B5EF4-FFF2-40B4-BE49-F238E27FC236}">
+                <a16:creationId xmlns:a16="http://schemas.microsoft.com/office/drawing/2014/main" id="{6B61EA0D-337E-916B-341D-D7B5BF4FEF3B}"/>
+              </a:ext>
+            </a:extLst>
+          </p:cNvPr>
+          <p:cNvSpPr>
+            <a:spLocks noGrp="1" noRot="1" noChangeAspect="1"/>
+          </p:cNvSpPr>
+          <p:nvPr>
+            <p:ph type="sldImg"/>
+          </p:nvPr>
+        </p:nvSpPr>
+        <p:spPr/>
+      </p:sp>
+      <p:sp>
+        <p:nvSpPr>
+          <p:cNvPr id="3" name="Notes Placeholder 2">
+            <a:extLst>
+              <a:ext uri="{FF2B5EF4-FFF2-40B4-BE49-F238E27FC236}">
+                <a16:creationId xmlns:a16="http://schemas.microsoft.com/office/drawing/2014/main" id="{DD016FE8-BC7F-154C-6773-D2207A1ED91D}"/>
+              </a:ext>
+            </a:extLst>
+          </p:cNvPr>
+          <p:cNvSpPr>
+            <a:spLocks noGrp="1"/>
+          </p:cNvSpPr>
+          <p:nvPr>
+            <p:ph type="body" idx="1"/>
+          </p:nvPr>
+        </p:nvSpPr>
+        <p:spPr/>
+        <p:txBody>
+          <a:bodyPr/>
+          <a:lstStyle/>
+          <a:p>
+            <a:endParaRPr lang="en-GB" dirty="0"/>
+          </a:p>
+        </p:txBody>
+      </p:sp>
+      <p:sp>
+        <p:nvSpPr>
+          <p:cNvPr id="4" name="Slide Number Placeholder 3">
+            <a:extLst>
+              <a:ext uri="{FF2B5EF4-FFF2-40B4-BE49-F238E27FC236}">
+                <a16:creationId xmlns:a16="http://schemas.microsoft.com/office/drawing/2014/main" id="{74F65357-3AF3-318B-DF3B-ABD174366F44}"/>
+              </a:ext>
+            </a:extLst>
+          </p:cNvPr>
+          <p:cNvSpPr>
+            <a:spLocks noGrp="1"/>
+          </p:cNvSpPr>
+          <p:nvPr>
+            <p:ph type="sldNum" sz="quarter" idx="5"/>
+          </p:nvPr>
+        </p:nvSpPr>
+        <p:spPr/>
+        <p:txBody>
+          <a:bodyPr/>
+          <a:lstStyle/>
+          <a:p>
+            <a:fld id="{D3A1C942-3B43-48F4-BEB8-B8FEBCDA6264}" type="slidenum">
+              <a:rPr lang="es-ES" smtClean="0"/>
+              <a:t>5</a:t>
+            </a:fld>
+            <a:endParaRPr lang="es-ES"/>
+          </a:p>
+        </p:txBody>
+      </p:sp>
+    </p:spTree>
+    <p:extLst>
+      <p:ext uri="{BB962C8B-B14F-4D97-AF65-F5344CB8AC3E}">
+        <p14:creationId xmlns:p14="http://schemas.microsoft.com/office/powerpoint/2010/main" val="2984340365"/>
+      </p:ext>
+    </p:extLst>
+  </p:cSld>
+  <p:clrMapOvr>
+    <a:masterClrMapping/>
+  </p:clrMapOvr>
+</p:notes>
+</file>
+
+<file path=ppt/notesSlides/notesSlide6.xml><?xml version="1.0" encoding="utf-8"?>
+<p:notes xmlns:a="http://schemas.openxmlformats.org/drawingml/2006/main" xmlns:r="http://schemas.openxmlformats.org/officeDocument/2006/relationships" xmlns:p="http://schemas.openxmlformats.org/presentationml/2006/main">
+  <p:cSld>
+    <p:spTree>
+      <p:nvGrpSpPr>
+        <p:cNvPr id="1" name="">
+          <a:extLst>
+            <a:ext uri="{FF2B5EF4-FFF2-40B4-BE49-F238E27FC236}">
+              <a16:creationId xmlns:a16="http://schemas.microsoft.com/office/drawing/2014/main" id="{FCDDD738-F406-3266-EADB-3D3DDAB23517}"/>
+            </a:ext>
+          </a:extLst>
+        </p:cNvPr>
+        <p:cNvGrpSpPr/>
+        <p:nvPr/>
+      </p:nvGrpSpPr>
+      <p:grpSpPr>
+        <a:xfrm>
+          <a:off x="0" y="0"/>
+          <a:ext cx="0" cy="0"/>
+          <a:chOff x="0" y="0"/>
+          <a:chExt cx="0" cy="0"/>
+        </a:xfrm>
+      </p:grpSpPr>
+      <p:sp>
+        <p:nvSpPr>
+          <p:cNvPr id="2" name="Slide Image Placeholder 1">
+            <a:extLst>
+              <a:ext uri="{FF2B5EF4-FFF2-40B4-BE49-F238E27FC236}">
+                <a16:creationId xmlns:a16="http://schemas.microsoft.com/office/drawing/2014/main" id="{529BC45C-7815-CA7A-0608-21AF15C04FAA}"/>
+              </a:ext>
+            </a:extLst>
+          </p:cNvPr>
+          <p:cNvSpPr>
+            <a:spLocks noGrp="1" noRot="1" noChangeAspect="1"/>
+          </p:cNvSpPr>
+          <p:nvPr>
+            <p:ph type="sldImg"/>
+          </p:nvPr>
+        </p:nvSpPr>
+        <p:spPr/>
+      </p:sp>
+      <p:sp>
+        <p:nvSpPr>
+          <p:cNvPr id="3" name="Notes Placeholder 2">
+            <a:extLst>
+              <a:ext uri="{FF2B5EF4-FFF2-40B4-BE49-F238E27FC236}">
+                <a16:creationId xmlns:a16="http://schemas.microsoft.com/office/drawing/2014/main" id="{ED170CCA-B389-C8A4-0151-C3903F43F567}"/>
+              </a:ext>
+            </a:extLst>
+          </p:cNvPr>
+          <p:cNvSpPr>
+            <a:spLocks noGrp="1"/>
+          </p:cNvSpPr>
+          <p:nvPr>
+            <p:ph type="body" idx="1"/>
+          </p:nvPr>
+        </p:nvSpPr>
+        <p:spPr/>
+        <p:txBody>
+          <a:bodyPr/>
+          <a:lstStyle/>
+          <a:p>
+            <a:endParaRPr lang="en-GB" dirty="0"/>
+          </a:p>
+        </p:txBody>
+      </p:sp>
+      <p:sp>
+        <p:nvSpPr>
+          <p:cNvPr id="4" name="Slide Number Placeholder 3">
+            <a:extLst>
+              <a:ext uri="{FF2B5EF4-FFF2-40B4-BE49-F238E27FC236}">
+                <a16:creationId xmlns:a16="http://schemas.microsoft.com/office/drawing/2014/main" id="{ED061210-8FA6-B994-3340-AB11FB4DDA6B}"/>
+              </a:ext>
+            </a:extLst>
+          </p:cNvPr>
+          <p:cNvSpPr>
+            <a:spLocks noGrp="1"/>
+          </p:cNvSpPr>
+          <p:nvPr>
+            <p:ph type="sldNum" sz="quarter" idx="5"/>
+          </p:nvPr>
+        </p:nvSpPr>
+        <p:spPr/>
+        <p:txBody>
+          <a:bodyPr/>
+          <a:lstStyle/>
+          <a:p>
+            <a:fld id="{D3A1C942-3B43-48F4-BEB8-B8FEBCDA6264}" type="slidenum">
+              <a:rPr lang="es-ES" smtClean="0"/>
+              <a:t>6</a:t>
+            </a:fld>
+            <a:endParaRPr lang="es-ES"/>
+          </a:p>
+        </p:txBody>
+      </p:sp>
+    </p:spTree>
+    <p:extLst>
+      <p:ext uri="{BB962C8B-B14F-4D97-AF65-F5344CB8AC3E}">
+        <p14:creationId xmlns:p14="http://schemas.microsoft.com/office/powerpoint/2010/main" val="2451188185"/>
+      </p:ext>
+    </p:extLst>
+  </p:cSld>
+  <p:clrMapOvr>
+    <a:masterClrMapping/>
+  </p:clrMapOvr>
+</p:notes>
+</file>
+
 <file path=ppt/slideLayouts/slideLayout1.xml><?xml version="1.0" encoding="utf-8"?>
 <p:sldLayout xmlns:a="http://schemas.openxmlformats.org/drawingml/2006/main" xmlns:r="http://schemas.openxmlformats.org/officeDocument/2006/relationships" xmlns:p="http://schemas.openxmlformats.org/presentationml/2006/main" type="title" preserve="1">
   <p:cSld name="Title Slide">
@@ -921,7 +1248,7 @@
               <a:pPr>
                 <a:defRPr/>
               </a:pPr>
-              <a:t>28/02/2025</a:t>
+              <a:t>10/03/2025</a:t>
             </a:fld>
             <a:endParaRPr lang="es-ES"/>
           </a:p>
@@ -1136,7 +1463,7 @@
               <a:pPr>
                 <a:defRPr/>
               </a:pPr>
-              <a:t>28/02/2025</a:t>
+              <a:t>10/03/2025</a:t>
             </a:fld>
             <a:endParaRPr lang="es-ES"/>
           </a:p>
@@ -1361,7 +1688,7 @@
               <a:pPr>
                 <a:defRPr/>
               </a:pPr>
-              <a:t>28/02/2025</a:t>
+              <a:t>10/03/2025</a:t>
             </a:fld>
             <a:endParaRPr lang="es-ES"/>
           </a:p>
@@ -1576,7 +1903,7 @@
               <a:pPr>
                 <a:defRPr/>
               </a:pPr>
-              <a:t>28/02/2025</a:t>
+              <a:t>10/03/2025</a:t>
             </a:fld>
             <a:endParaRPr lang="es-ES"/>
           </a:p>
@@ -1867,7 +2194,7 @@
               <a:pPr>
                 <a:defRPr/>
               </a:pPr>
-              <a:t>28/02/2025</a:t>
+              <a:t>10/03/2025</a:t>
             </a:fld>
             <a:endParaRPr lang="es-ES"/>
           </a:p>
@@ -2150,7 +2477,7 @@
               <a:pPr>
                 <a:defRPr/>
               </a:pPr>
-              <a:t>28/02/2025</a:t>
+              <a:t>10/03/2025</a:t>
             </a:fld>
             <a:endParaRPr lang="es-ES"/>
           </a:p>
@@ -2580,7 +2907,7 @@
               <a:pPr>
                 <a:defRPr/>
               </a:pPr>
-              <a:t>28/02/2025</a:t>
+              <a:t>10/03/2025</a:t>
             </a:fld>
             <a:endParaRPr lang="es-ES"/>
           </a:p>
@@ -2737,7 +3064,7 @@
               <a:pPr>
                 <a:defRPr/>
               </a:pPr>
-              <a:t>2/28/2025</a:t>
+              <a:t>3/10/2025</a:t>
             </a:fld>
             <a:endParaRPr lang="en-US"/>
           </a:p>
@@ -2865,7 +3192,7 @@
               <a:pPr>
                 <a:defRPr/>
               </a:pPr>
-              <a:t>28/02/2025</a:t>
+              <a:t>10/03/2025</a:t>
             </a:fld>
             <a:endParaRPr lang="es-ES"/>
           </a:p>
@@ -3193,7 +3520,7 @@
               <a:pPr>
                 <a:defRPr/>
               </a:pPr>
-              <a:t>28/02/2025</a:t>
+              <a:t>10/03/2025</a:t>
             </a:fld>
             <a:endParaRPr lang="es-ES"/>
           </a:p>
@@ -3497,7 +3824,7 @@
               <a:pPr>
                 <a:defRPr/>
               </a:pPr>
-              <a:t>28/02/2025</a:t>
+              <a:t>10/03/2025</a:t>
             </a:fld>
             <a:endParaRPr lang="es-ES"/>
           </a:p>
@@ -3755,7 +4082,7 @@
               <a:pPr>
                 <a:defRPr/>
               </a:pPr>
-              <a:t>28/02/2025</a:t>
+              <a:t>10/03/2025</a:t>
             </a:fld>
             <a:endParaRPr lang="es-ES"/>
           </a:p>
@@ -5602,7 +5929,7 @@
             </a:pPr>
             <a:r>
               <a:rPr lang="es-ES" dirty="0"/>
-              <a:t>Disponibilidad de pequeños ahorros</a:t>
+              <a:t>Disponibilidad de algunos ahorros</a:t>
             </a:r>
           </a:p>
           <a:p>
@@ -5786,7 +6113,7 @@
         <p:spPr>
           <a:xfrm>
             <a:off x="2104053" y="1284905"/>
-            <a:ext cx="4763278" cy="1754326"/>
+            <a:ext cx="4763278" cy="1477328"/>
           </a:xfrm>
           <a:prstGeom prst="rect">
             <a:avLst/>
@@ -5815,7 +6142,7 @@
             </a:pPr>
             <a:r>
               <a:rPr lang="es-ES" dirty="0"/>
-              <a:t>Idea de negocio poco común, menores probabilidades de éxito</a:t>
+              <a:t>Idea de negocio poco común, mayor riesgo</a:t>
             </a:r>
           </a:p>
           <a:p>
@@ -6243,6 +6570,204 @@
     <p:extLst>
       <p:ext uri="{BB962C8B-B14F-4D97-AF65-F5344CB8AC3E}">
         <p14:creationId xmlns:p14="http://schemas.microsoft.com/office/powerpoint/2010/main" val="849906005"/>
+      </p:ext>
+    </p:extLst>
+  </p:cSld>
+  <p:clrMapOvr>
+    <a:masterClrMapping/>
+  </p:clrMapOvr>
+</p:sld>
+</file>
+
+<file path=ppt/slides/slide4.xml><?xml version="1.0" encoding="utf-8"?>
+<p:sld xmlns:a="http://schemas.openxmlformats.org/drawingml/2006/main" xmlns:r="http://schemas.openxmlformats.org/officeDocument/2006/relationships" xmlns:p="http://schemas.openxmlformats.org/presentationml/2006/main">
+  <p:cSld>
+    <p:spTree>
+      <p:nvGrpSpPr>
+        <p:cNvPr id="1" name="">
+          <a:extLst>
+            <a:ext uri="{FF2B5EF4-FFF2-40B4-BE49-F238E27FC236}">
+              <a16:creationId xmlns:a16="http://schemas.microsoft.com/office/drawing/2014/main" id="{F3B80736-8157-5DAC-3ED4-4E01148E1902}"/>
+            </a:ext>
+          </a:extLst>
+        </p:cNvPr>
+        <p:cNvGrpSpPr/>
+        <p:nvPr/>
+      </p:nvGrpSpPr>
+      <p:grpSpPr>
+        <a:xfrm>
+          <a:off x="0" y="0"/>
+          <a:ext cx="0" cy="0"/>
+          <a:chOff x="0" y="0"/>
+          <a:chExt cx="0" cy="0"/>
+        </a:xfrm>
+      </p:grpSpPr>
+      <p:pic>
+        <p:nvPicPr>
+          <p:cNvPr id="8" name="Picture 7">
+            <a:extLst>
+              <a:ext uri="{FF2B5EF4-FFF2-40B4-BE49-F238E27FC236}">
+                <a16:creationId xmlns:a16="http://schemas.microsoft.com/office/drawing/2014/main" id="{1E686689-7DF1-F7F1-7465-5EE479AFE1CC}"/>
+              </a:ext>
+            </a:extLst>
+          </p:cNvPr>
+          <p:cNvPicPr>
+            <a:picLocks noGrp="1" noRot="1" noChangeAspect="1" noMove="1" noResize="1" noEditPoints="1" noAdjustHandles="1" noChangeArrowheads="1" noChangeShapeType="1" noCrop="1"/>
+          </p:cNvPicPr>
+          <p:nvPr/>
+        </p:nvPicPr>
+        <p:blipFill>
+          <a:blip r:embed="rId3"/>
+          <a:stretch>
+            <a:fillRect/>
+          </a:stretch>
+        </p:blipFill>
+        <p:spPr>
+          <a:xfrm>
+            <a:off x="1347555" y="0"/>
+            <a:ext cx="9496890" cy="6858000"/>
+          </a:xfrm>
+          <a:prstGeom prst="rect">
+            <a:avLst/>
+          </a:prstGeom>
+        </p:spPr>
+      </p:pic>
+    </p:spTree>
+    <p:extLst>
+      <p:ext uri="{BB962C8B-B14F-4D97-AF65-F5344CB8AC3E}">
+        <p14:creationId xmlns:p14="http://schemas.microsoft.com/office/powerpoint/2010/main" val="3679733132"/>
+      </p:ext>
+    </p:extLst>
+  </p:cSld>
+  <p:clrMapOvr>
+    <a:masterClrMapping/>
+  </p:clrMapOvr>
+</p:sld>
+</file>
+
+<file path=ppt/slides/slide5.xml><?xml version="1.0" encoding="utf-8"?>
+<p:sld xmlns:a="http://schemas.openxmlformats.org/drawingml/2006/main" xmlns:r="http://schemas.openxmlformats.org/officeDocument/2006/relationships" xmlns:p="http://schemas.openxmlformats.org/presentationml/2006/main">
+  <p:cSld>
+    <p:spTree>
+      <p:nvGrpSpPr>
+        <p:cNvPr id="1" name="">
+          <a:extLst>
+            <a:ext uri="{FF2B5EF4-FFF2-40B4-BE49-F238E27FC236}">
+              <a16:creationId xmlns:a16="http://schemas.microsoft.com/office/drawing/2014/main" id="{13061A15-C2BE-3D59-938C-1807107C94FD}"/>
+            </a:ext>
+          </a:extLst>
+        </p:cNvPr>
+        <p:cNvGrpSpPr/>
+        <p:nvPr/>
+      </p:nvGrpSpPr>
+      <p:grpSpPr>
+        <a:xfrm>
+          <a:off x="0" y="0"/>
+          <a:ext cx="0" cy="0"/>
+          <a:chOff x="0" y="0"/>
+          <a:chExt cx="0" cy="0"/>
+        </a:xfrm>
+      </p:grpSpPr>
+      <p:pic>
+        <p:nvPicPr>
+          <p:cNvPr id="3" name="Picture 2">
+            <a:extLst>
+              <a:ext uri="{FF2B5EF4-FFF2-40B4-BE49-F238E27FC236}">
+                <a16:creationId xmlns:a16="http://schemas.microsoft.com/office/drawing/2014/main" id="{1AC1BF4C-9F24-2A84-3019-ACCA01CBE961}"/>
+              </a:ext>
+            </a:extLst>
+          </p:cNvPr>
+          <p:cNvPicPr>
+            <a:picLocks noGrp="1" noRot="1" noChangeAspect="1" noMove="1" noResize="1" noEditPoints="1" noAdjustHandles="1" noChangeArrowheads="1" noChangeShapeType="1" noCrop="1"/>
+          </p:cNvPicPr>
+          <p:nvPr/>
+        </p:nvPicPr>
+        <p:blipFill>
+          <a:blip r:embed="rId3"/>
+          <a:stretch>
+            <a:fillRect/>
+          </a:stretch>
+        </p:blipFill>
+        <p:spPr>
+          <a:xfrm>
+            <a:off x="1352614" y="0"/>
+            <a:ext cx="9486771" cy="6858000"/>
+          </a:xfrm>
+          <a:prstGeom prst="rect">
+            <a:avLst/>
+          </a:prstGeom>
+        </p:spPr>
+      </p:pic>
+    </p:spTree>
+    <p:extLst>
+      <p:ext uri="{BB962C8B-B14F-4D97-AF65-F5344CB8AC3E}">
+        <p14:creationId xmlns:p14="http://schemas.microsoft.com/office/powerpoint/2010/main" val="2314756102"/>
+      </p:ext>
+    </p:extLst>
+  </p:cSld>
+  <p:clrMapOvr>
+    <a:masterClrMapping/>
+  </p:clrMapOvr>
+</p:sld>
+</file>
+
+<file path=ppt/slides/slide6.xml><?xml version="1.0" encoding="utf-8"?>
+<p:sld xmlns:a="http://schemas.openxmlformats.org/drawingml/2006/main" xmlns:r="http://schemas.openxmlformats.org/officeDocument/2006/relationships" xmlns:p="http://schemas.openxmlformats.org/presentationml/2006/main">
+  <p:cSld>
+    <p:spTree>
+      <p:nvGrpSpPr>
+        <p:cNvPr id="1" name="">
+          <a:extLst>
+            <a:ext uri="{FF2B5EF4-FFF2-40B4-BE49-F238E27FC236}">
+              <a16:creationId xmlns:a16="http://schemas.microsoft.com/office/drawing/2014/main" id="{77D087BF-5385-6DDA-5648-9E7641A346F8}"/>
+            </a:ext>
+          </a:extLst>
+        </p:cNvPr>
+        <p:cNvGrpSpPr/>
+        <p:nvPr/>
+      </p:nvGrpSpPr>
+      <p:grpSpPr>
+        <a:xfrm>
+          <a:off x="0" y="0"/>
+          <a:ext cx="0" cy="0"/>
+          <a:chOff x="0" y="0"/>
+          <a:chExt cx="0" cy="0"/>
+        </a:xfrm>
+      </p:grpSpPr>
+      <p:pic>
+        <p:nvPicPr>
+          <p:cNvPr id="3" name="Picture 2">
+            <a:extLst>
+              <a:ext uri="{FF2B5EF4-FFF2-40B4-BE49-F238E27FC236}">
+                <a16:creationId xmlns:a16="http://schemas.microsoft.com/office/drawing/2014/main" id="{BDD3BCB5-0452-7735-4274-E02E31107A80}"/>
+              </a:ext>
+            </a:extLst>
+          </p:cNvPr>
+          <p:cNvPicPr>
+            <a:picLocks noGrp="1" noRot="1" noChangeAspect="1" noMove="1" noResize="1" noEditPoints="1" noAdjustHandles="1" noChangeArrowheads="1" noChangeShapeType="1" noCrop="1"/>
+          </p:cNvPicPr>
+          <p:nvPr/>
+        </p:nvPicPr>
+        <p:blipFill>
+          <a:blip r:embed="rId3"/>
+          <a:stretch>
+            <a:fillRect/>
+          </a:stretch>
+        </p:blipFill>
+        <p:spPr>
+          <a:xfrm>
+            <a:off x="1321987" y="0"/>
+            <a:ext cx="9548025" cy="6858000"/>
+          </a:xfrm>
+          <a:prstGeom prst="rect">
+            <a:avLst/>
+          </a:prstGeom>
+        </p:spPr>
+      </p:pic>
+    </p:spTree>
+    <p:extLst>
+      <p:ext uri="{BB962C8B-B14F-4D97-AF65-F5344CB8AC3E}">
+        <p14:creationId xmlns:p14="http://schemas.microsoft.com/office/powerpoint/2010/main" val="4020904531"/>
       </p:ext>
     </p:extLst>
   </p:cSld>

</xml_diff>

<commit_message>
Update meeting 3 mentoring
</commit_message>
<xml_diff>
--- a/explorer/mentoring/business_model_canvas_spanish.pptx
+++ b/explorer/mentoring/business_model_canvas_spanish.pptx
@@ -5,7 +5,7 @@
     <p:sldMasterId id="2147483681" r:id="rId4"/>
   </p:sldMasterIdLst>
   <p:notesMasterIdLst>
-    <p:notesMasterId r:id="rId11"/>
+    <p:notesMasterId r:id="rId12"/>
   </p:notesMasterIdLst>
   <p:sldIdLst>
     <p:sldId id="480" r:id="rId5"/>
@@ -13,7 +13,8 @@
     <p:sldId id="482" r:id="rId7"/>
     <p:sldId id="483" r:id="rId8"/>
     <p:sldId id="484" r:id="rId9"/>
-    <p:sldId id="485" r:id="rId10"/>
+    <p:sldId id="486" r:id="rId10"/>
+    <p:sldId id="485" r:id="rId11"/>
   </p:sldIdLst>
   <p:sldSz cx="12192000" cy="6858000"/>
   <p:notesSz cx="6858000" cy="9144000"/>
@@ -202,7 +203,7 @@
           <a:p>
             <a:fld id="{C8FFD48F-8719-40F2-B0CF-2A5A63C0F0B9}" type="datetimeFigureOut">
               <a:rPr lang="es-ES" smtClean="0"/>
-              <a:t>10/03/2025</a:t>
+              <a:t>31/03/2025</a:t>
             </a:fld>
             <a:endParaRPr lang="es-ES"/>
           </a:p>
@@ -993,6 +994,114 @@
         <p:cNvPr id="1" name="">
           <a:extLst>
             <a:ext uri="{FF2B5EF4-FFF2-40B4-BE49-F238E27FC236}">
+              <a16:creationId xmlns:a16="http://schemas.microsoft.com/office/drawing/2014/main" id="{D245784C-FAFE-3D9B-E9A3-10A0F0C604CE}"/>
+            </a:ext>
+          </a:extLst>
+        </p:cNvPr>
+        <p:cNvGrpSpPr/>
+        <p:nvPr/>
+      </p:nvGrpSpPr>
+      <p:grpSpPr>
+        <a:xfrm>
+          <a:off x="0" y="0"/>
+          <a:ext cx="0" cy="0"/>
+          <a:chOff x="0" y="0"/>
+          <a:chExt cx="0" cy="0"/>
+        </a:xfrm>
+      </p:grpSpPr>
+      <p:sp>
+        <p:nvSpPr>
+          <p:cNvPr id="2" name="Slide Image Placeholder 1">
+            <a:extLst>
+              <a:ext uri="{FF2B5EF4-FFF2-40B4-BE49-F238E27FC236}">
+                <a16:creationId xmlns:a16="http://schemas.microsoft.com/office/drawing/2014/main" id="{07E91D03-7273-5548-AC5C-1AA76DB7BB53}"/>
+              </a:ext>
+            </a:extLst>
+          </p:cNvPr>
+          <p:cNvSpPr>
+            <a:spLocks noGrp="1" noRot="1" noChangeAspect="1"/>
+          </p:cNvSpPr>
+          <p:nvPr>
+            <p:ph type="sldImg"/>
+          </p:nvPr>
+        </p:nvSpPr>
+        <p:spPr/>
+      </p:sp>
+      <p:sp>
+        <p:nvSpPr>
+          <p:cNvPr id="3" name="Notes Placeholder 2">
+            <a:extLst>
+              <a:ext uri="{FF2B5EF4-FFF2-40B4-BE49-F238E27FC236}">
+                <a16:creationId xmlns:a16="http://schemas.microsoft.com/office/drawing/2014/main" id="{48C18F3A-3DF4-E599-BBDE-916199E95AEE}"/>
+              </a:ext>
+            </a:extLst>
+          </p:cNvPr>
+          <p:cNvSpPr>
+            <a:spLocks noGrp="1"/>
+          </p:cNvSpPr>
+          <p:nvPr>
+            <p:ph type="body" idx="1"/>
+          </p:nvPr>
+        </p:nvSpPr>
+        <p:spPr/>
+        <p:txBody>
+          <a:bodyPr/>
+          <a:lstStyle/>
+          <a:p>
+            <a:endParaRPr lang="en-GB" dirty="0"/>
+          </a:p>
+        </p:txBody>
+      </p:sp>
+      <p:sp>
+        <p:nvSpPr>
+          <p:cNvPr id="4" name="Slide Number Placeholder 3">
+            <a:extLst>
+              <a:ext uri="{FF2B5EF4-FFF2-40B4-BE49-F238E27FC236}">
+                <a16:creationId xmlns:a16="http://schemas.microsoft.com/office/drawing/2014/main" id="{D76D4D30-A9DA-B308-B023-D82035577015}"/>
+              </a:ext>
+            </a:extLst>
+          </p:cNvPr>
+          <p:cNvSpPr>
+            <a:spLocks noGrp="1"/>
+          </p:cNvSpPr>
+          <p:nvPr>
+            <p:ph type="sldNum" sz="quarter" idx="5"/>
+          </p:nvPr>
+        </p:nvSpPr>
+        <p:spPr/>
+        <p:txBody>
+          <a:bodyPr/>
+          <a:lstStyle/>
+          <a:p>
+            <a:fld id="{D3A1C942-3B43-48F4-BEB8-B8FEBCDA6264}" type="slidenum">
+              <a:rPr lang="es-ES" smtClean="0"/>
+              <a:t>6</a:t>
+            </a:fld>
+            <a:endParaRPr lang="es-ES"/>
+          </a:p>
+        </p:txBody>
+      </p:sp>
+    </p:spTree>
+    <p:extLst>
+      <p:ext uri="{BB962C8B-B14F-4D97-AF65-F5344CB8AC3E}">
+        <p14:creationId xmlns:p14="http://schemas.microsoft.com/office/powerpoint/2010/main" val="3739727615"/>
+      </p:ext>
+    </p:extLst>
+  </p:cSld>
+  <p:clrMapOvr>
+    <a:masterClrMapping/>
+  </p:clrMapOvr>
+</p:notes>
+</file>
+
+<file path=ppt/notesSlides/notesSlide7.xml><?xml version="1.0" encoding="utf-8"?>
+<p:notes xmlns:a="http://schemas.openxmlformats.org/drawingml/2006/main" xmlns:r="http://schemas.openxmlformats.org/officeDocument/2006/relationships" xmlns:p="http://schemas.openxmlformats.org/presentationml/2006/main">
+  <p:cSld>
+    <p:spTree>
+      <p:nvGrpSpPr>
+        <p:cNvPr id="1" name="">
+          <a:extLst>
+            <a:ext uri="{FF2B5EF4-FFF2-40B4-BE49-F238E27FC236}">
               <a16:creationId xmlns:a16="http://schemas.microsoft.com/office/drawing/2014/main" id="{FCDDD738-F406-3266-EADB-3D3DDAB23517}"/>
             </a:ext>
           </a:extLst>
@@ -1074,7 +1183,7 @@
           <a:p>
             <a:fld id="{D3A1C942-3B43-48F4-BEB8-B8FEBCDA6264}" type="slidenum">
               <a:rPr lang="es-ES" smtClean="0"/>
-              <a:t>6</a:t>
+              <a:t>7</a:t>
             </a:fld>
             <a:endParaRPr lang="es-ES"/>
           </a:p>
@@ -1248,7 +1357,7 @@
               <a:pPr>
                 <a:defRPr/>
               </a:pPr>
-              <a:t>10/03/2025</a:t>
+              <a:t>31/03/2025</a:t>
             </a:fld>
             <a:endParaRPr lang="es-ES"/>
           </a:p>
@@ -1463,7 +1572,7 @@
               <a:pPr>
                 <a:defRPr/>
               </a:pPr>
-              <a:t>10/03/2025</a:t>
+              <a:t>31/03/2025</a:t>
             </a:fld>
             <a:endParaRPr lang="es-ES"/>
           </a:p>
@@ -1688,7 +1797,7 @@
               <a:pPr>
                 <a:defRPr/>
               </a:pPr>
-              <a:t>10/03/2025</a:t>
+              <a:t>31/03/2025</a:t>
             </a:fld>
             <a:endParaRPr lang="es-ES"/>
           </a:p>
@@ -1903,7 +2012,7 @@
               <a:pPr>
                 <a:defRPr/>
               </a:pPr>
-              <a:t>10/03/2025</a:t>
+              <a:t>31/03/2025</a:t>
             </a:fld>
             <a:endParaRPr lang="es-ES"/>
           </a:p>
@@ -2194,7 +2303,7 @@
               <a:pPr>
                 <a:defRPr/>
               </a:pPr>
-              <a:t>10/03/2025</a:t>
+              <a:t>31/03/2025</a:t>
             </a:fld>
             <a:endParaRPr lang="es-ES"/>
           </a:p>
@@ -2477,7 +2586,7 @@
               <a:pPr>
                 <a:defRPr/>
               </a:pPr>
-              <a:t>10/03/2025</a:t>
+              <a:t>31/03/2025</a:t>
             </a:fld>
             <a:endParaRPr lang="es-ES"/>
           </a:p>
@@ -2907,7 +3016,7 @@
               <a:pPr>
                 <a:defRPr/>
               </a:pPr>
-              <a:t>10/03/2025</a:t>
+              <a:t>31/03/2025</a:t>
             </a:fld>
             <a:endParaRPr lang="es-ES"/>
           </a:p>
@@ -3064,7 +3173,7 @@
               <a:pPr>
                 <a:defRPr/>
               </a:pPr>
-              <a:t>3/10/2025</a:t>
+              <a:t>3/31/2025</a:t>
             </a:fld>
             <a:endParaRPr lang="en-US"/>
           </a:p>
@@ -3192,7 +3301,7 @@
               <a:pPr>
                 <a:defRPr/>
               </a:pPr>
-              <a:t>10/03/2025</a:t>
+              <a:t>31/03/2025</a:t>
             </a:fld>
             <a:endParaRPr lang="es-ES"/>
           </a:p>
@@ -3520,7 +3629,7 @@
               <a:pPr>
                 <a:defRPr/>
               </a:pPr>
-              <a:t>10/03/2025</a:t>
+              <a:t>31/03/2025</a:t>
             </a:fld>
             <a:endParaRPr lang="es-ES"/>
           </a:p>
@@ -3824,7 +3933,7 @@
               <a:pPr>
                 <a:defRPr/>
               </a:pPr>
-              <a:t>10/03/2025</a:t>
+              <a:t>31/03/2025</a:t>
             </a:fld>
             <a:endParaRPr lang="es-ES"/>
           </a:p>
@@ -4082,7 +4191,7 @@
               <a:pPr>
                 <a:defRPr/>
               </a:pPr>
-              <a:t>10/03/2025</a:t>
+              <a:t>31/03/2025</a:t>
             </a:fld>
             <a:endParaRPr lang="es-ES"/>
           </a:p>
@@ -4678,7 +4787,7 @@
         <p:spPr>
           <a:xfrm>
             <a:off x="9629192" y="755781"/>
-            <a:ext cx="2313990" cy="3477875"/>
+            <a:ext cx="2313990" cy="2292935"/>
           </a:xfrm>
           <a:prstGeom prst="rect">
             <a:avLst/>
@@ -4697,7 +4806,7 @@
             </a:pPr>
             <a:r>
               <a:rPr lang="es-ES" sz="1100" dirty="0"/>
-              <a:t>Hombres de 30 a 44 años, aficionados a la tecnología.</a:t>
+              <a:t>Hombres de 18 a 44 años, aficionados a la tecnología.</a:t>
             </a:r>
           </a:p>
           <a:p>
@@ -4707,7 +4816,7 @@
             </a:pPr>
             <a:r>
               <a:rPr lang="es-ES" sz="1100" dirty="0"/>
-              <a:t>INCLUIR 18-29</a:t>
+              <a:t>Sin carnet de conducir</a:t>
             </a:r>
           </a:p>
           <a:p>
@@ -4717,7 +4826,7 @@
             </a:pPr>
             <a:r>
               <a:rPr lang="es-ES" sz="1100" dirty="0"/>
-              <a:t>Usuarios que buscan un medio de transporte personal pero los patinetes no cumplen sus requisitos (ir por campo, cabe en maletero)</a:t>
+              <a:t>Buscan transporte lo más rápido posible en ciudad (&gt; que t. público y coche)</a:t>
             </a:r>
           </a:p>
           <a:p>
@@ -4725,10 +4834,6 @@
               <a:buFont typeface="Arial" panose="020B0604020202020204" pitchFamily="34" charset="0"/>
               <a:buChar char="•"/>
             </a:pPr>
-            <a:r>
-              <a:rPr lang="es-ES" sz="1100" dirty="0"/>
-              <a:t>¿</a:t>
-            </a:r>
             <a:r>
               <a:rPr lang="es-ES" sz="1100" dirty="0" err="1"/>
               <a:t>Early</a:t>
@@ -4743,7 +4848,7 @@
             </a:r>
             <a:r>
               <a:rPr lang="es-ES" sz="1100" dirty="0"/>
-              <a:t> son personas que van a comprar su primer monociclo, o ya tienen uno? AQUEL AL QUE ES MÁS FÁCIL CONVENCER O EXPLICAR</a:t>
+              <a:t> probablemente  personas  que ya tienen uno. (Validar)</a:t>
             </a:r>
           </a:p>
           <a:p>
@@ -4753,25 +4858,32 @@
             </a:pPr>
             <a:r>
               <a:rPr lang="es-ES" sz="1100" dirty="0"/>
-              <a:t>Geográficamente ?</a:t>
-            </a:r>
-          </a:p>
-          <a:p>
-            <a:pPr marL="628650" lvl="1" indent="-171450">
-              <a:buFont typeface="Arial" panose="020B0604020202020204" pitchFamily="34" charset="0"/>
-              <a:buChar char="•"/>
-            </a:pPr>
+              <a:t>Geográficamente, </a:t>
+            </a:r>
+            <a:r>
+              <a:rPr lang="es-ES" sz="1100" b="1" dirty="0"/>
+              <a:t>por ahora cerca </a:t>
+            </a:r>
             <a:r>
               <a:rPr lang="es-ES" sz="1100" dirty="0"/>
-              <a:t>INICIALMENTE CERCA, GARANTÍA, ASISTENCIA TÉCNICA. Internet en futuro.</a:t>
-            </a:r>
-          </a:p>
-          <a:p>
-            <a:pPr marL="171450" indent="-171450">
-              <a:buFont typeface="Arial" panose="020B0604020202020204" pitchFamily="34" charset="0"/>
-              <a:buChar char="•"/>
-            </a:pPr>
-            <a:endParaRPr lang="es-ES" sz="1100" dirty="0"/>
+              <a:t>(dar servicio, asistencia </a:t>
+            </a:r>
+            <a:r>
+              <a:rPr lang="es-ES" sz="1100" dirty="0" err="1"/>
+              <a:t>etc</a:t>
+            </a:r>
+            <a:r>
+              <a:rPr lang="es-ES" sz="1100" dirty="0"/>
+              <a:t>) (Baby </a:t>
+            </a:r>
+            <a:r>
+              <a:rPr lang="es-ES" sz="1100" dirty="0" err="1"/>
+              <a:t>Diseases</a:t>
+            </a:r>
+            <a:r>
+              <a:rPr lang="es-ES" sz="1100" dirty="0"/>
+              <a:t>)</a:t>
+            </a:r>
           </a:p>
           <a:p>
             <a:pPr marL="171450" indent="-171450">
@@ -4796,8 +4908,8 @@
         </p:nvSpPr>
         <p:spPr>
           <a:xfrm>
-            <a:off x="2654559" y="3125661"/>
-            <a:ext cx="2313991" cy="1615827"/>
+            <a:off x="2640560" y="2982537"/>
+            <a:ext cx="2313991" cy="1954381"/>
           </a:xfrm>
           <a:prstGeom prst="rect">
             <a:avLst/>
@@ -4849,6 +4961,16 @@
               <a:t>En el futuro: Comunidad que desarrolle por su cuenta en base a los diseños abiertos</a:t>
             </a:r>
           </a:p>
+          <a:p>
+            <a:pPr marL="171450" indent="-171450">
+              <a:buFont typeface="Arial" panose="020B0604020202020204" pitchFamily="34" charset="0"/>
+              <a:buChar char="•"/>
+            </a:pPr>
+            <a:r>
+              <a:rPr lang="es-ES" sz="1100" dirty="0"/>
+              <a:t>Futuro: stock, recursos para entrega en plazo corto</a:t>
+            </a:r>
+          </a:p>
         </p:txBody>
       </p:sp>
       <p:sp>
@@ -4866,7 +4988,7 @@
         <p:spPr>
           <a:xfrm>
             <a:off x="7315200" y="2994856"/>
-            <a:ext cx="2313990" cy="1954381"/>
+            <a:ext cx="2313990" cy="2123658"/>
           </a:xfrm>
           <a:prstGeom prst="rect">
             <a:avLst/>
@@ -4885,7 +5007,7 @@
             </a:pPr>
             <a:r>
               <a:rPr lang="es-ES" sz="1100" dirty="0"/>
-              <a:t>Contenido en YouTube sobre el desarrollo, recortes a resto de redes sociales.</a:t>
+              <a:t>Comunicación: contenido en YouTube sobre el desarrollo, recortes a resto de redes sociales.</a:t>
             </a:r>
           </a:p>
           <a:p>
@@ -5048,7 +5170,7 @@
         <p:spPr>
           <a:xfrm>
             <a:off x="326572" y="624976"/>
-            <a:ext cx="2313989" cy="4154984"/>
+            <a:ext cx="2313989" cy="4493538"/>
           </a:xfrm>
           <a:prstGeom prst="rect">
             <a:avLst/>
@@ -5107,6 +5229,29 @@
               <a:rPr lang="es-ES" sz="1100" dirty="0"/>
               <a:t>Comunidades quedadas de monociclos, posibles clientes</a:t>
             </a:r>
+          </a:p>
+          <a:p>
+            <a:pPr marL="171450" indent="-171450">
+              <a:buFont typeface="Arial" panose="020B0604020202020204" pitchFamily="34" charset="0"/>
+              <a:buChar char="•"/>
+            </a:pPr>
+            <a:r>
+              <a:rPr lang="es-ES" sz="1100" dirty="0"/>
+              <a:t>Grupo </a:t>
+            </a:r>
+            <a:r>
+              <a:rPr lang="es-ES" sz="1100" dirty="0" err="1"/>
+              <a:t>Builders</a:t>
+            </a:r>
+            <a:r>
+              <a:rPr lang="es-ES" sz="1100" dirty="0"/>
+              <a:t> </a:t>
+            </a:r>
+            <a:r>
+              <a:rPr lang="es-ES" sz="1100" dirty="0" err="1"/>
+              <a:t>Telegram</a:t>
+            </a:r>
+            <a:endParaRPr lang="es-ES" sz="1100" dirty="0"/>
           </a:p>
           <a:p>
             <a:pPr marL="171450" indent="-171450">
@@ -5328,8 +5473,8 @@
         </p:nvSpPr>
         <p:spPr>
           <a:xfrm>
-            <a:off x="6176865" y="5376944"/>
-            <a:ext cx="4851919" cy="1277273"/>
+            <a:off x="6158204" y="5320297"/>
+            <a:ext cx="5689667" cy="1446550"/>
           </a:xfrm>
           <a:prstGeom prst="rect">
             <a:avLst/>
@@ -5347,8 +5492,12 @@
               <a:buChar char="•"/>
             </a:pPr>
             <a:r>
+              <a:rPr lang="es-ES" sz="1100" b="1" dirty="0"/>
+              <a:t>Venta directa del monociclo</a:t>
+            </a:r>
+            <a:r>
               <a:rPr lang="es-ES" sz="1100" dirty="0"/>
-              <a:t>Venta directa del monociclo (comerciales rondan 3k, nosotros ~5k?)</a:t>
+              <a:t> (comerciales rondan 3k, nosotros ~5k?)</a:t>
             </a:r>
           </a:p>
           <a:p>
@@ -5548,7 +5697,65 @@
               <a:rPr lang="en-GB" sz="1100" dirty="0" err="1"/>
               <a:t>venta</a:t>
             </a:r>
+            <a:r>
+              <a:rPr lang="en-GB" sz="1100" dirty="0"/>
+              <a:t>. </a:t>
+            </a:r>
+            <a:r>
+              <a:rPr lang="en-GB" sz="1100" dirty="0" err="1"/>
+              <a:t>Utilizar</a:t>
+            </a:r>
+            <a:r>
+              <a:rPr lang="en-GB" sz="1100" dirty="0"/>
+              <a:t> </a:t>
+            </a:r>
+            <a:r>
+              <a:rPr lang="en-GB" sz="1100" dirty="0" err="1"/>
+              <a:t>empresa</a:t>
+            </a:r>
+            <a:r>
+              <a:rPr lang="en-GB" sz="1100" dirty="0"/>
+              <a:t> </a:t>
+            </a:r>
+            <a:r>
+              <a:rPr lang="en-GB" sz="1100" dirty="0" err="1"/>
+              <a:t>existente</a:t>
+            </a:r>
             <a:endParaRPr lang="en-GB" sz="1100" dirty="0"/>
+          </a:p>
+          <a:p>
+            <a:pPr marL="171450" indent="-171450">
+              <a:buFont typeface="Arial" panose="020B0604020202020204" pitchFamily="34" charset="0"/>
+              <a:buChar char="•"/>
+            </a:pPr>
+            <a:r>
+              <a:rPr lang="en-GB" sz="1100" dirty="0"/>
+              <a:t>B2B? (</a:t>
+            </a:r>
+            <a:r>
+              <a:rPr lang="en-GB" sz="1100" dirty="0" err="1"/>
+              <a:t>mantenimiento</a:t>
+            </a:r>
+            <a:r>
+              <a:rPr lang="en-GB" sz="1100" dirty="0"/>
+              <a:t>, </a:t>
+            </a:r>
+            <a:r>
+              <a:rPr lang="en-GB" sz="1100" dirty="0" err="1"/>
+              <a:t>problemas</a:t>
+            </a:r>
+            <a:r>
+              <a:rPr lang="en-GB" sz="1100" dirty="0"/>
+              <a:t> </a:t>
+            </a:r>
+            <a:r>
+              <a:rPr lang="en-GB" sz="1100" dirty="0" err="1"/>
+              <a:t>específicos</a:t>
+            </a:r>
+            <a:r>
+              <a:rPr lang="en-GB" sz="1100" dirty="0"/>
+              <a:t>)</a:t>
+            </a:r>
           </a:p>
         </p:txBody>
       </p:sp>
@@ -6066,7 +6273,7 @@
             </a:pPr>
             <a:r>
               <a:rPr lang="es-ES" dirty="0"/>
-              <a:t>Mal entorno fiscal en España</a:t>
+              <a:t>Mal entorno legal en España</a:t>
             </a:r>
           </a:p>
           <a:p>
@@ -6277,7 +6484,7 @@
         <p:spPr>
           <a:xfrm>
             <a:off x="6963083" y="907225"/>
-            <a:ext cx="4882400" cy="2554545"/>
+            <a:ext cx="4882400" cy="2308324"/>
           </a:xfrm>
           <a:prstGeom prst="rect">
             <a:avLst/>
@@ -6306,7 +6513,7 @@
             </a:pPr>
             <a:r>
               <a:rPr lang="es-ES" sz="1600" dirty="0"/>
-              <a:t>Considerar subvenciones/exenciones fiscales para proyectos de movilidad sostenible, o el traslado</a:t>
+              <a:t>Estudiar subvenciones/exenciones fiscales para proyectos de movilidad sostenible</a:t>
             </a:r>
           </a:p>
           <a:p>
@@ -6372,15 +6579,15 @@
               <a:buChar char="•"/>
             </a:pPr>
             <a:r>
-              <a:rPr lang="es-ES" dirty="0"/>
+              <a:rPr lang="es-ES" b="1" dirty="0"/>
               <a:t>Comunicar claramente las ventajas open-</a:t>
             </a:r>
             <a:r>
-              <a:rPr lang="es-ES" dirty="0" err="1"/>
+              <a:rPr lang="es-ES" b="1" dirty="0" err="1"/>
               <a:t>source</a:t>
             </a:r>
             <a:r>
-              <a:rPr lang="es-ES" dirty="0"/>
+              <a:rPr lang="es-ES" b="1" dirty="0"/>
               <a:t> y generar contenido</a:t>
             </a:r>
           </a:p>
@@ -6632,6 +6839,304 @@
           </a:prstGeom>
         </p:spPr>
       </p:pic>
+      <p:sp>
+        <p:nvSpPr>
+          <p:cNvPr id="3" name="TextBox 2">
+            <a:extLst>
+              <a:ext uri="{FF2B5EF4-FFF2-40B4-BE49-F238E27FC236}">
+                <a16:creationId xmlns:a16="http://schemas.microsoft.com/office/drawing/2014/main" id="{9FB437C2-AE1C-3AB9-E555-CA66FE000C48}"/>
+              </a:ext>
+            </a:extLst>
+          </p:cNvPr>
+          <p:cNvSpPr txBox="1"/>
+          <p:nvPr/>
+        </p:nvSpPr>
+        <p:spPr>
+          <a:xfrm>
+            <a:off x="1628190" y="3200401"/>
+            <a:ext cx="2922033" cy="3293209"/>
+          </a:xfrm>
+          <a:prstGeom prst="rect">
+            <a:avLst/>
+          </a:prstGeom>
+          <a:noFill/>
+        </p:spPr>
+        <p:txBody>
+          <a:bodyPr wrap="square" rtlCol="0">
+            <a:spAutoFit/>
+          </a:bodyPr>
+          <a:lstStyle/>
+          <a:p>
+            <a:pPr marL="285750" indent="-285750">
+              <a:buFont typeface="Arial" panose="020B0604020202020204" pitchFamily="34" charset="0"/>
+              <a:buChar char="•"/>
+            </a:pPr>
+            <a:r>
+              <a:rPr lang="es-ES" sz="1600" dirty="0"/>
+              <a:t>Existe demanda de alternativas más rápidas para transporte urbano.</a:t>
+            </a:r>
+          </a:p>
+          <a:p>
+            <a:pPr marL="285750" indent="-285750">
+              <a:buFont typeface="Arial" panose="020B0604020202020204" pitchFamily="34" charset="0"/>
+              <a:buChar char="•"/>
+            </a:pPr>
+            <a:r>
+              <a:rPr lang="es-ES" sz="1600" dirty="0"/>
+              <a:t>Es viable construir un prototipo que cumpla con estas características.</a:t>
+            </a:r>
+          </a:p>
+          <a:p>
+            <a:pPr marL="285750" indent="-285750">
+              <a:buFont typeface="Arial" panose="020B0604020202020204" pitchFamily="34" charset="0"/>
+              <a:buChar char="•"/>
+            </a:pPr>
+            <a:r>
+              <a:rPr lang="es-ES" sz="1600" dirty="0"/>
+              <a:t>Usuarios urbanos y profesionales valoran la resistencia y bajo mantenimiento.</a:t>
+            </a:r>
+          </a:p>
+          <a:p>
+            <a:pPr marL="285750" indent="-285750">
+              <a:buFont typeface="Arial" panose="020B0604020202020204" pitchFamily="34" charset="0"/>
+              <a:buChar char="•"/>
+            </a:pPr>
+            <a:r>
+              <a:rPr lang="es-ES" sz="1600" dirty="0"/>
+              <a:t>Pruebas reales validarán la solución.</a:t>
+            </a:r>
+          </a:p>
+          <a:p>
+            <a:pPr marL="285750" indent="-285750">
+              <a:buFont typeface="Arial" panose="020B0604020202020204" pitchFamily="34" charset="0"/>
+              <a:buChar char="•"/>
+            </a:pPr>
+            <a:endParaRPr lang="en-GB" sz="1600" dirty="0"/>
+          </a:p>
+        </p:txBody>
+      </p:sp>
+      <p:sp>
+        <p:nvSpPr>
+          <p:cNvPr id="4" name="TextBox 3">
+            <a:extLst>
+              <a:ext uri="{FF2B5EF4-FFF2-40B4-BE49-F238E27FC236}">
+                <a16:creationId xmlns:a16="http://schemas.microsoft.com/office/drawing/2014/main" id="{A209D9E2-5052-6C8D-C1B2-81A7AC2A499A}"/>
+              </a:ext>
+            </a:extLst>
+          </p:cNvPr>
+          <p:cNvSpPr txBox="1"/>
+          <p:nvPr/>
+        </p:nvSpPr>
+        <p:spPr>
+          <a:xfrm>
+            <a:off x="1628191" y="1209545"/>
+            <a:ext cx="8935620" cy="584775"/>
+          </a:xfrm>
+          <a:prstGeom prst="rect">
+            <a:avLst/>
+          </a:prstGeom>
+          <a:noFill/>
+        </p:spPr>
+        <p:txBody>
+          <a:bodyPr wrap="square" rtlCol="0">
+            <a:spAutoFit/>
+          </a:bodyPr>
+          <a:lstStyle/>
+          <a:p>
+            <a:r>
+              <a:rPr lang="es-ES" sz="1600" dirty="0"/>
+              <a:t>Monociclo eléctrico que realmente es práctico para el día a día: Es fiable, resiste lluvia y golpes, es duradero con el tiempo.</a:t>
+            </a:r>
+            <a:endParaRPr lang="en-GB" sz="1600" dirty="0"/>
+          </a:p>
+        </p:txBody>
+      </p:sp>
+      <p:sp>
+        <p:nvSpPr>
+          <p:cNvPr id="5" name="TextBox 4">
+            <a:extLst>
+              <a:ext uri="{FF2B5EF4-FFF2-40B4-BE49-F238E27FC236}">
+                <a16:creationId xmlns:a16="http://schemas.microsoft.com/office/drawing/2014/main" id="{BE5AA191-2598-7F49-D41F-2031ED9E7019}"/>
+              </a:ext>
+            </a:extLst>
+          </p:cNvPr>
+          <p:cNvSpPr txBox="1"/>
+          <p:nvPr/>
+        </p:nvSpPr>
+        <p:spPr>
+          <a:xfrm>
+            <a:off x="4634985" y="3200401"/>
+            <a:ext cx="2922033" cy="2024721"/>
+          </a:xfrm>
+          <a:prstGeom prst="rect">
+            <a:avLst/>
+          </a:prstGeom>
+          <a:noFill/>
+        </p:spPr>
+        <p:txBody>
+          <a:bodyPr wrap="square" rtlCol="0">
+            <a:spAutoFit/>
+          </a:bodyPr>
+          <a:lstStyle/>
+          <a:p>
+            <a:pPr marL="285750" indent="-285750">
+              <a:lnSpc>
+                <a:spcPts val="1500"/>
+              </a:lnSpc>
+              <a:buFont typeface="Arial" panose="020B0604020202020204" pitchFamily="34" charset="0"/>
+              <a:buChar char="•"/>
+            </a:pPr>
+            <a:r>
+              <a:rPr lang="es-ES" sz="1600" dirty="0"/>
+              <a:t>Usuarios de EUC por Hobby que buscan uno para transporte diario</a:t>
+            </a:r>
+          </a:p>
+          <a:p>
+            <a:pPr marL="285750" indent="-285750">
+              <a:lnSpc>
+                <a:spcPts val="1500"/>
+              </a:lnSpc>
+              <a:buFont typeface="Arial" panose="020B0604020202020204" pitchFamily="34" charset="0"/>
+              <a:buChar char="•"/>
+            </a:pPr>
+            <a:r>
+              <a:rPr lang="es-ES" sz="1600" dirty="0"/>
+              <a:t>Usuarios urbanos sin coche en propiedad</a:t>
+            </a:r>
+          </a:p>
+          <a:p>
+            <a:pPr marL="285750" indent="-285750">
+              <a:lnSpc>
+                <a:spcPts val="1500"/>
+              </a:lnSpc>
+              <a:buFont typeface="Arial" panose="020B0604020202020204" pitchFamily="34" charset="0"/>
+              <a:buChar char="•"/>
+            </a:pPr>
+            <a:r>
+              <a:rPr lang="es-ES" sz="1600" dirty="0"/>
+              <a:t>Personas jóvenes sin permiso para conducir</a:t>
+            </a:r>
+          </a:p>
+          <a:p>
+            <a:pPr marL="285750" indent="-285750">
+              <a:lnSpc>
+                <a:spcPts val="1500"/>
+              </a:lnSpc>
+              <a:buFont typeface="Arial" panose="020B0604020202020204" pitchFamily="34" charset="0"/>
+              <a:buChar char="•"/>
+            </a:pPr>
+            <a:r>
+              <a:rPr lang="es-ES" sz="1600" dirty="0"/>
+              <a:t>Personas que trabajan con transporte (repartidores </a:t>
+            </a:r>
+            <a:r>
+              <a:rPr lang="es-ES" sz="1600" dirty="0" err="1"/>
+              <a:t>etc</a:t>
+            </a:r>
+            <a:r>
+              <a:rPr lang="es-ES" sz="1600" dirty="0"/>
+              <a:t>)</a:t>
+            </a:r>
+          </a:p>
+        </p:txBody>
+      </p:sp>
+      <p:sp>
+        <p:nvSpPr>
+          <p:cNvPr id="7" name="TextBox 6">
+            <a:extLst>
+              <a:ext uri="{FF2B5EF4-FFF2-40B4-BE49-F238E27FC236}">
+                <a16:creationId xmlns:a16="http://schemas.microsoft.com/office/drawing/2014/main" id="{41952908-38D8-A69F-58BA-4C67D9459AAE}"/>
+              </a:ext>
+            </a:extLst>
+          </p:cNvPr>
+          <p:cNvSpPr txBox="1"/>
+          <p:nvPr/>
+        </p:nvSpPr>
+        <p:spPr>
+          <a:xfrm>
+            <a:off x="7641776" y="3200401"/>
+            <a:ext cx="2922034" cy="2794163"/>
+          </a:xfrm>
+          <a:prstGeom prst="rect">
+            <a:avLst/>
+          </a:prstGeom>
+          <a:noFill/>
+        </p:spPr>
+        <p:txBody>
+          <a:bodyPr wrap="square" rtlCol="0">
+            <a:spAutoFit/>
+          </a:bodyPr>
+          <a:lstStyle/>
+          <a:p>
+            <a:pPr marL="285750" indent="-285750">
+              <a:lnSpc>
+                <a:spcPts val="1500"/>
+              </a:lnSpc>
+              <a:buFont typeface="Arial" panose="020B0604020202020204" pitchFamily="34" charset="0"/>
+              <a:buChar char="•"/>
+            </a:pPr>
+            <a:r>
+              <a:rPr lang="es-ES" sz="1600" dirty="0"/>
+              <a:t>Diseñar y construir un prototipo de pruebas, para cambiar piezas y experimentar rápidamente</a:t>
+            </a:r>
+          </a:p>
+          <a:p>
+            <a:pPr marL="285750" indent="-285750">
+              <a:lnSpc>
+                <a:spcPts val="1500"/>
+              </a:lnSpc>
+              <a:buFont typeface="Arial" panose="020B0604020202020204" pitchFamily="34" charset="0"/>
+              <a:buChar char="•"/>
+            </a:pPr>
+            <a:r>
+              <a:rPr lang="es-ES" sz="1600" dirty="0"/>
+              <a:t>Probarlo en diferentes entornos (lluvia, polvo, pendientes, golpes, velocidades, potencia…)</a:t>
+            </a:r>
+          </a:p>
+          <a:p>
+            <a:pPr marL="285750" indent="-285750">
+              <a:lnSpc>
+                <a:spcPts val="1500"/>
+              </a:lnSpc>
+              <a:buFont typeface="Arial" panose="020B0604020202020204" pitchFamily="34" charset="0"/>
+              <a:buChar char="•"/>
+            </a:pPr>
+            <a:r>
+              <a:rPr lang="es-ES" sz="1600" dirty="0"/>
+              <a:t>Obtener </a:t>
+            </a:r>
+            <a:r>
+              <a:rPr lang="es-ES" sz="1600" dirty="0" err="1"/>
+              <a:t>feedback</a:t>
+            </a:r>
+            <a:r>
+              <a:rPr lang="es-ES" sz="1600" dirty="0"/>
+              <a:t> de usuarios reales (repartidores, urbanos).  </a:t>
+            </a:r>
+          </a:p>
+          <a:p>
+            <a:pPr marL="285750" indent="-285750">
+              <a:lnSpc>
+                <a:spcPts val="1500"/>
+              </a:lnSpc>
+              <a:buFont typeface="Arial" panose="020B0604020202020204" pitchFamily="34" charset="0"/>
+              <a:buChar char="•"/>
+            </a:pPr>
+            <a:r>
+              <a:rPr lang="es-ES" sz="1600" dirty="0"/>
+              <a:t>Comparar con </a:t>
+            </a:r>
+            <a:r>
+              <a:rPr lang="es-ES" sz="1600" dirty="0" err="1"/>
+              <a:t>EUCs</a:t>
+            </a:r>
+            <a:r>
+              <a:rPr lang="es-ES" sz="1600" dirty="0"/>
+              <a:t> comerciales en durabilidad y mantenimiento.</a:t>
+            </a:r>
+          </a:p>
+        </p:txBody>
+      </p:sp>
     </p:spTree>
     <p:extLst>
       <p:ext uri="{BB962C8B-B14F-4D97-AF65-F5344CB8AC3E}">
@@ -6698,6 +7203,294 @@
           </a:prstGeom>
         </p:spPr>
       </p:pic>
+      <p:sp>
+        <p:nvSpPr>
+          <p:cNvPr id="2" name="TextBox 1">
+            <a:extLst>
+              <a:ext uri="{FF2B5EF4-FFF2-40B4-BE49-F238E27FC236}">
+                <a16:creationId xmlns:a16="http://schemas.microsoft.com/office/drawing/2014/main" id="{44D30604-D00F-2F6F-3004-0FFF16C91788}"/>
+              </a:ext>
+            </a:extLst>
+          </p:cNvPr>
+          <p:cNvSpPr txBox="1"/>
+          <p:nvPr/>
+        </p:nvSpPr>
+        <p:spPr>
+          <a:xfrm>
+            <a:off x="6162869" y="1734654"/>
+            <a:ext cx="2208245" cy="523220"/>
+          </a:xfrm>
+          <a:prstGeom prst="rect">
+            <a:avLst/>
+          </a:prstGeom>
+          <a:noFill/>
+        </p:spPr>
+        <p:txBody>
+          <a:bodyPr wrap="square" rtlCol="0">
+            <a:spAutoFit/>
+          </a:bodyPr>
+          <a:lstStyle/>
+          <a:p>
+            <a:r>
+              <a:rPr lang="es-ES_tradnl" sz="1400" dirty="0"/>
+              <a:t>Fabricar chasis corte laser</a:t>
+            </a:r>
+            <a:endParaRPr lang="en-GB" sz="1400" dirty="0"/>
+          </a:p>
+        </p:txBody>
+      </p:sp>
+      <p:sp>
+        <p:nvSpPr>
+          <p:cNvPr id="4" name="TextBox 3">
+            <a:extLst>
+              <a:ext uri="{FF2B5EF4-FFF2-40B4-BE49-F238E27FC236}">
+                <a16:creationId xmlns:a16="http://schemas.microsoft.com/office/drawing/2014/main" id="{FA7E0306-F8AF-7191-219F-4AB7E12FB626}"/>
+              </a:ext>
+            </a:extLst>
+          </p:cNvPr>
+          <p:cNvSpPr txBox="1"/>
+          <p:nvPr/>
+        </p:nvSpPr>
+        <p:spPr>
+          <a:xfrm>
+            <a:off x="3954624" y="1734654"/>
+            <a:ext cx="2208245" cy="523220"/>
+          </a:xfrm>
+          <a:prstGeom prst="rect">
+            <a:avLst/>
+          </a:prstGeom>
+          <a:noFill/>
+        </p:spPr>
+        <p:txBody>
+          <a:bodyPr wrap="square" rtlCol="0">
+            <a:spAutoFit/>
+          </a:bodyPr>
+          <a:lstStyle/>
+          <a:p>
+            <a:r>
+              <a:rPr lang="es-ES_tradnl" sz="1400" dirty="0"/>
+              <a:t>Publicar contenido en redes</a:t>
+            </a:r>
+            <a:endParaRPr lang="en-GB" sz="1400" dirty="0"/>
+          </a:p>
+        </p:txBody>
+      </p:sp>
+      <p:sp>
+        <p:nvSpPr>
+          <p:cNvPr id="5" name="TextBox 4">
+            <a:extLst>
+              <a:ext uri="{FF2B5EF4-FFF2-40B4-BE49-F238E27FC236}">
+                <a16:creationId xmlns:a16="http://schemas.microsoft.com/office/drawing/2014/main" id="{E5B04491-7AA2-6F0C-01E5-7D91422FBF90}"/>
+              </a:ext>
+            </a:extLst>
+          </p:cNvPr>
+          <p:cNvSpPr txBox="1"/>
+          <p:nvPr/>
+        </p:nvSpPr>
+        <p:spPr>
+          <a:xfrm>
+            <a:off x="8371114" y="1734654"/>
+            <a:ext cx="2208245" cy="738664"/>
+          </a:xfrm>
+          <a:prstGeom prst="rect">
+            <a:avLst/>
+          </a:prstGeom>
+          <a:noFill/>
+        </p:spPr>
+        <p:txBody>
+          <a:bodyPr wrap="square" rtlCol="0">
+            <a:spAutoFit/>
+          </a:bodyPr>
+          <a:lstStyle/>
+          <a:p>
+            <a:r>
+              <a:rPr lang="es-ES_tradnl" sz="1400" dirty="0"/>
+              <a:t>Prototipo moviéndose (no suficiente para montar por ahora)</a:t>
+            </a:r>
+            <a:endParaRPr lang="en-GB" sz="1400" dirty="0"/>
+          </a:p>
+        </p:txBody>
+      </p:sp>
+      <p:sp>
+        <p:nvSpPr>
+          <p:cNvPr id="7" name="TextBox 6">
+            <a:extLst>
+              <a:ext uri="{FF2B5EF4-FFF2-40B4-BE49-F238E27FC236}">
+                <a16:creationId xmlns:a16="http://schemas.microsoft.com/office/drawing/2014/main" id="{DBF6A1C5-E072-F0EE-9AC2-2B46DE3FEC93}"/>
+              </a:ext>
+            </a:extLst>
+          </p:cNvPr>
+          <p:cNvSpPr txBox="1"/>
+          <p:nvPr/>
+        </p:nvSpPr>
+        <p:spPr>
+          <a:xfrm>
+            <a:off x="1352614" y="1734654"/>
+            <a:ext cx="2468273" cy="523220"/>
+          </a:xfrm>
+          <a:prstGeom prst="rect">
+            <a:avLst/>
+          </a:prstGeom>
+          <a:noFill/>
+        </p:spPr>
+        <p:txBody>
+          <a:bodyPr wrap="square" rtlCol="0">
+            <a:spAutoFit/>
+          </a:bodyPr>
+          <a:lstStyle/>
+          <a:p>
+            <a:r>
+              <a:rPr lang="es-ES_tradnl" sz="1400" dirty="0"/>
+              <a:t>Conseguir montar (incorporar chasis y calibrar software)</a:t>
+            </a:r>
+            <a:endParaRPr lang="en-GB" sz="1400" dirty="0"/>
+          </a:p>
+        </p:txBody>
+      </p:sp>
+      <p:sp>
+        <p:nvSpPr>
+          <p:cNvPr id="8" name="TextBox 7">
+            <a:extLst>
+              <a:ext uri="{FF2B5EF4-FFF2-40B4-BE49-F238E27FC236}">
+                <a16:creationId xmlns:a16="http://schemas.microsoft.com/office/drawing/2014/main" id="{4B49C935-28F2-DAD7-50AB-52C19D9ECFDE}"/>
+              </a:ext>
+            </a:extLst>
+          </p:cNvPr>
+          <p:cNvSpPr txBox="1"/>
+          <p:nvPr/>
+        </p:nvSpPr>
+        <p:spPr>
+          <a:xfrm>
+            <a:off x="1352614" y="2920347"/>
+            <a:ext cx="2468273" cy="738664"/>
+          </a:xfrm>
+          <a:prstGeom prst="rect">
+            <a:avLst/>
+          </a:prstGeom>
+          <a:noFill/>
+        </p:spPr>
+        <p:txBody>
+          <a:bodyPr wrap="square" rtlCol="0">
+            <a:spAutoFit/>
+          </a:bodyPr>
+          <a:lstStyle/>
+          <a:p>
+            <a:r>
+              <a:rPr lang="es-ES_tradnl" sz="1400" dirty="0"/>
+              <a:t>Validar: Es mejor vender a personas que ya tienen monociclo o clientes nuevos?</a:t>
+            </a:r>
+            <a:endParaRPr lang="en-GB" sz="1400" dirty="0"/>
+          </a:p>
+        </p:txBody>
+      </p:sp>
+      <p:sp>
+        <p:nvSpPr>
+          <p:cNvPr id="9" name="TextBox 8">
+            <a:extLst>
+              <a:ext uri="{FF2B5EF4-FFF2-40B4-BE49-F238E27FC236}">
+                <a16:creationId xmlns:a16="http://schemas.microsoft.com/office/drawing/2014/main" id="{D6D8FB21-DDA3-907B-FFD8-C0B296F65D83}"/>
+              </a:ext>
+            </a:extLst>
+          </p:cNvPr>
+          <p:cNvSpPr txBox="1"/>
+          <p:nvPr/>
+        </p:nvSpPr>
+        <p:spPr>
+          <a:xfrm>
+            <a:off x="4928732" y="559550"/>
+            <a:ext cx="2468273" cy="307777"/>
+          </a:xfrm>
+          <a:prstGeom prst="rect">
+            <a:avLst/>
+          </a:prstGeom>
+          <a:noFill/>
+        </p:spPr>
+        <p:txBody>
+          <a:bodyPr wrap="square" rtlCol="0">
+            <a:spAutoFit/>
+          </a:bodyPr>
+          <a:lstStyle/>
+          <a:p>
+            <a:r>
+              <a:rPr lang="es-ES_tradnl" sz="1400" dirty="0"/>
+              <a:t>2 líneas: desarrollo y negocio</a:t>
+            </a:r>
+            <a:endParaRPr lang="en-GB" sz="1400" dirty="0"/>
+          </a:p>
+        </p:txBody>
+      </p:sp>
+      <p:sp>
+        <p:nvSpPr>
+          <p:cNvPr id="10" name="TextBox 9">
+            <a:extLst>
+              <a:ext uri="{FF2B5EF4-FFF2-40B4-BE49-F238E27FC236}">
+                <a16:creationId xmlns:a16="http://schemas.microsoft.com/office/drawing/2014/main" id="{D6981499-F48B-5392-80BB-AEBF14080E80}"/>
+              </a:ext>
+            </a:extLst>
+          </p:cNvPr>
+          <p:cNvSpPr txBox="1"/>
+          <p:nvPr/>
+        </p:nvSpPr>
+        <p:spPr>
+          <a:xfrm>
+            <a:off x="1082352" y="3743082"/>
+            <a:ext cx="2738535" cy="954107"/>
+          </a:xfrm>
+          <a:prstGeom prst="rect">
+            <a:avLst/>
+          </a:prstGeom>
+          <a:noFill/>
+        </p:spPr>
+        <p:txBody>
+          <a:bodyPr wrap="square" rtlCol="0">
+            <a:spAutoFit/>
+          </a:bodyPr>
+          <a:lstStyle/>
+          <a:p>
+            <a:r>
+              <a:rPr lang="es-ES_tradnl" sz="1400" dirty="0"/>
+              <a:t>?Comprar componentes para futuro prototipo (y adelantar la espera. Para batería 84V, motor, pedales, electrónica…)</a:t>
+            </a:r>
+            <a:endParaRPr lang="en-GB" sz="1400" dirty="0"/>
+          </a:p>
+        </p:txBody>
+      </p:sp>
+      <p:sp>
+        <p:nvSpPr>
+          <p:cNvPr id="11" name="TextBox 10">
+            <a:extLst>
+              <a:ext uri="{FF2B5EF4-FFF2-40B4-BE49-F238E27FC236}">
+                <a16:creationId xmlns:a16="http://schemas.microsoft.com/office/drawing/2014/main" id="{D9961EAD-8AD7-9F13-197B-2E009C45CE14}"/>
+              </a:ext>
+            </a:extLst>
+          </p:cNvPr>
+          <p:cNvSpPr txBox="1"/>
+          <p:nvPr/>
+        </p:nvSpPr>
+        <p:spPr>
+          <a:xfrm>
+            <a:off x="1679510" y="2313056"/>
+            <a:ext cx="2208245" cy="523220"/>
+          </a:xfrm>
+          <a:prstGeom prst="rect">
+            <a:avLst/>
+          </a:prstGeom>
+          <a:noFill/>
+        </p:spPr>
+        <p:txBody>
+          <a:bodyPr wrap="square" rtlCol="0">
+            <a:spAutoFit/>
+          </a:bodyPr>
+          <a:lstStyle/>
+          <a:p>
+            <a:r>
+              <a:rPr lang="es-ES_tradnl" sz="1400" dirty="0"/>
+              <a:t>Validar chasis por corte laser (rígido, estanco)</a:t>
+            </a:r>
+            <a:endParaRPr lang="en-GB" sz="1400" dirty="0"/>
+          </a:p>
+        </p:txBody>
+      </p:sp>
     </p:spTree>
     <p:extLst>
       <p:ext uri="{BB962C8B-B14F-4D97-AF65-F5344CB8AC3E}">
@@ -6712,6 +7505,190 @@
 </file>
 
 <file path=ppt/slides/slide6.xml><?xml version="1.0" encoding="utf-8"?>
+<p:sld xmlns:a="http://schemas.openxmlformats.org/drawingml/2006/main" xmlns:r="http://schemas.openxmlformats.org/officeDocument/2006/relationships" xmlns:p="http://schemas.openxmlformats.org/presentationml/2006/main">
+  <p:cSld>
+    <p:spTree>
+      <p:nvGrpSpPr>
+        <p:cNvPr id="1" name="">
+          <a:extLst>
+            <a:ext uri="{FF2B5EF4-FFF2-40B4-BE49-F238E27FC236}">
+              <a16:creationId xmlns:a16="http://schemas.microsoft.com/office/drawing/2014/main" id="{1F7D10A7-73FF-CF8E-3B8D-070FF8D51960}"/>
+            </a:ext>
+          </a:extLst>
+        </p:cNvPr>
+        <p:cNvGrpSpPr/>
+        <p:nvPr/>
+      </p:nvGrpSpPr>
+      <p:grpSpPr>
+        <a:xfrm>
+          <a:off x="0" y="0"/>
+          <a:ext cx="0" cy="0"/>
+          <a:chOff x="0" y="0"/>
+          <a:chExt cx="0" cy="0"/>
+        </a:xfrm>
+      </p:grpSpPr>
+      <p:sp>
+        <p:nvSpPr>
+          <p:cNvPr id="9" name="TextBox 8">
+            <a:extLst>
+              <a:ext uri="{FF2B5EF4-FFF2-40B4-BE49-F238E27FC236}">
+                <a16:creationId xmlns:a16="http://schemas.microsoft.com/office/drawing/2014/main" id="{ED00A751-1A16-6BCA-8B9C-41AA907731D7}"/>
+              </a:ext>
+            </a:extLst>
+          </p:cNvPr>
+          <p:cNvSpPr txBox="1"/>
+          <p:nvPr/>
+        </p:nvSpPr>
+        <p:spPr>
+          <a:xfrm>
+            <a:off x="4928732" y="559550"/>
+            <a:ext cx="2468273" cy="307777"/>
+          </a:xfrm>
+          <a:prstGeom prst="rect">
+            <a:avLst/>
+          </a:prstGeom>
+          <a:noFill/>
+        </p:spPr>
+        <p:txBody>
+          <a:bodyPr wrap="square" rtlCol="0">
+            <a:spAutoFit/>
+          </a:bodyPr>
+          <a:lstStyle/>
+          <a:p>
+            <a:r>
+              <a:rPr lang="es-ES_tradnl" sz="1400" dirty="0"/>
+              <a:t>Tareas prototipo</a:t>
+            </a:r>
+            <a:endParaRPr lang="en-GB" sz="1400" dirty="0"/>
+          </a:p>
+        </p:txBody>
+      </p:sp>
+      <p:sp>
+        <p:nvSpPr>
+          <p:cNvPr id="6" name="TextBox 5">
+            <a:extLst>
+              <a:ext uri="{FF2B5EF4-FFF2-40B4-BE49-F238E27FC236}">
+                <a16:creationId xmlns:a16="http://schemas.microsoft.com/office/drawing/2014/main" id="{F7B6D465-971F-8795-F02E-30B94050C5F4}"/>
+              </a:ext>
+            </a:extLst>
+          </p:cNvPr>
+          <p:cNvSpPr txBox="1"/>
+          <p:nvPr/>
+        </p:nvSpPr>
+        <p:spPr>
+          <a:xfrm>
+            <a:off x="3863340" y="873594"/>
+            <a:ext cx="5105400" cy="3108543"/>
+          </a:xfrm>
+          <a:prstGeom prst="rect">
+            <a:avLst/>
+          </a:prstGeom>
+          <a:noFill/>
+        </p:spPr>
+        <p:txBody>
+          <a:bodyPr wrap="square" rtlCol="0">
+            <a:spAutoFit/>
+          </a:bodyPr>
+          <a:lstStyle/>
+          <a:p>
+            <a:pPr marL="285750" indent="-285750">
+              <a:buFontTx/>
+              <a:buChar char="-"/>
+            </a:pPr>
+            <a:r>
+              <a:rPr lang="es-ES_tradnl" sz="1400" dirty="0"/>
+              <a:t>Kanban o simplemente tareas. con tareas </a:t>
+            </a:r>
+            <a:r>
+              <a:rPr lang="es-ES_tradnl" sz="1400" dirty="0" err="1"/>
+              <a:t>etc</a:t>
+            </a:r>
+            <a:r>
+              <a:rPr lang="es-ES_tradnl" sz="1400" dirty="0"/>
+              <a:t>, preparar </a:t>
+            </a:r>
+            <a:r>
+              <a:rPr lang="es-ES_tradnl" sz="1400" dirty="0" err="1"/>
+              <a:t>Notion</a:t>
+            </a:r>
+            <a:r>
+              <a:rPr lang="es-ES_tradnl" sz="1400" dirty="0"/>
+              <a:t>. Listar TODO lo que hace falta, componentes. Hacer, haciendo hecho.</a:t>
+            </a:r>
+          </a:p>
+          <a:p>
+            <a:pPr marL="285750" indent="-285750">
+              <a:buFontTx/>
+              <a:buChar char="-"/>
+            </a:pPr>
+            <a:r>
+              <a:rPr lang="es-ES_tradnl" sz="1400" dirty="0"/>
+              <a:t>Cuándo doy por válido prototipo: poder montar a baja velocidad, aprender a montar con él.</a:t>
+            </a:r>
+          </a:p>
+          <a:p>
+            <a:pPr marL="285750" indent="-285750">
+              <a:buFontTx/>
+              <a:buChar char="-"/>
+            </a:pPr>
+            <a:r>
+              <a:rPr lang="es-ES_tradnl" sz="1400" dirty="0"/>
+              <a:t>Listar las mejoras principales en README.md, analizarlas, </a:t>
+            </a:r>
+            <a:r>
+              <a:rPr lang="es-ES_tradnl" sz="1400" dirty="0" err="1"/>
+              <a:t>jutificar</a:t>
+            </a:r>
+            <a:r>
+              <a:rPr lang="es-ES_tradnl" sz="1400" dirty="0"/>
+              <a:t> por qué no tienen la competencia, son mejores</a:t>
+            </a:r>
+          </a:p>
+          <a:p>
+            <a:pPr marL="285750" indent="-285750">
+              <a:buFontTx/>
+              <a:buChar char="-"/>
+            </a:pPr>
+            <a:endParaRPr lang="es-ES_tradnl" sz="1400" dirty="0"/>
+          </a:p>
+          <a:p>
+            <a:pPr marL="285750" indent="-285750">
+              <a:buFontTx/>
+              <a:buChar char="-"/>
+            </a:pPr>
+            <a:endParaRPr lang="es-ES_tradnl" sz="1400" dirty="0"/>
+          </a:p>
+          <a:p>
+            <a:endParaRPr lang="es-ES_tradnl" sz="1400" dirty="0"/>
+          </a:p>
+          <a:p>
+            <a:endParaRPr lang="es-ES_tradnl" sz="1400" dirty="0"/>
+          </a:p>
+          <a:p>
+            <a:endParaRPr lang="es-ES_tradnl" sz="1400" dirty="0"/>
+          </a:p>
+          <a:p>
+            <a:endParaRPr lang="es-ES_tradnl" sz="1400" dirty="0"/>
+          </a:p>
+          <a:p>
+            <a:endParaRPr lang="en-GB" sz="1400" dirty="0"/>
+          </a:p>
+        </p:txBody>
+      </p:sp>
+    </p:spTree>
+    <p:extLst>
+      <p:ext uri="{BB962C8B-B14F-4D97-AF65-F5344CB8AC3E}">
+        <p14:creationId xmlns:p14="http://schemas.microsoft.com/office/powerpoint/2010/main" val="917337848"/>
+      </p:ext>
+    </p:extLst>
+  </p:cSld>
+  <p:clrMapOvr>
+    <a:masterClrMapping/>
+  </p:clrMapOvr>
+</p:sld>
+</file>
+
+<file path=ppt/slides/slide7.xml><?xml version="1.0" encoding="utf-8"?>
 <p:sld xmlns:a="http://schemas.openxmlformats.org/drawingml/2006/main" xmlns:r="http://schemas.openxmlformats.org/officeDocument/2006/relationships" xmlns:p="http://schemas.openxmlformats.org/presentationml/2006/main">
   <p:cSld>
     <p:spTree>
@@ -6764,6 +7741,355 @@
           </a:prstGeom>
         </p:spPr>
       </p:pic>
+      <p:sp>
+        <p:nvSpPr>
+          <p:cNvPr id="2" name="TextBox 1">
+            <a:extLst>
+              <a:ext uri="{FF2B5EF4-FFF2-40B4-BE49-F238E27FC236}">
+                <a16:creationId xmlns:a16="http://schemas.microsoft.com/office/drawing/2014/main" id="{2BF9F742-25CA-B365-DECC-4F06B833DD57}"/>
+              </a:ext>
+            </a:extLst>
+          </p:cNvPr>
+          <p:cNvSpPr txBox="1"/>
+          <p:nvPr/>
+        </p:nvSpPr>
+        <p:spPr>
+          <a:xfrm>
+            <a:off x="6923315" y="1031433"/>
+            <a:ext cx="3871316" cy="646331"/>
+          </a:xfrm>
+          <a:prstGeom prst="rect">
+            <a:avLst/>
+          </a:prstGeom>
+          <a:noFill/>
+        </p:spPr>
+        <p:txBody>
+          <a:bodyPr wrap="none" rtlCol="0">
+            <a:spAutoFit/>
+          </a:bodyPr>
+          <a:lstStyle/>
+          <a:p>
+            <a:r>
+              <a:rPr lang="es-ES_tradnl" dirty="0"/>
+              <a:t>Inversores</a:t>
+            </a:r>
+          </a:p>
+          <a:p>
+            <a:r>
+              <a:rPr lang="es-ES_tradnl" dirty="0" err="1"/>
+              <a:t>Influencers</a:t>
+            </a:r>
+            <a:r>
+              <a:rPr lang="es-ES_tradnl" dirty="0"/>
+              <a:t> (</a:t>
+            </a:r>
+            <a:r>
+              <a:rPr lang="es-ES_tradnl" dirty="0" err="1"/>
+              <a:t>Youtube</a:t>
+            </a:r>
+            <a:r>
+              <a:rPr lang="es-ES_tradnl" dirty="0"/>
+              <a:t> principalmente)</a:t>
+            </a:r>
+            <a:endParaRPr lang="en-GB" dirty="0"/>
+          </a:p>
+        </p:txBody>
+      </p:sp>
+      <p:sp>
+        <p:nvSpPr>
+          <p:cNvPr id="4" name="TextBox 3">
+            <a:extLst>
+              <a:ext uri="{FF2B5EF4-FFF2-40B4-BE49-F238E27FC236}">
+                <a16:creationId xmlns:a16="http://schemas.microsoft.com/office/drawing/2014/main" id="{8B8F2DBF-5070-9029-3DD2-D747C2A2D1A8}"/>
+              </a:ext>
+            </a:extLst>
+          </p:cNvPr>
+          <p:cNvSpPr txBox="1"/>
+          <p:nvPr/>
+        </p:nvSpPr>
+        <p:spPr>
+          <a:xfrm>
+            <a:off x="7716770" y="4847337"/>
+            <a:ext cx="4294894" cy="369332"/>
+          </a:xfrm>
+          <a:prstGeom prst="rect">
+            <a:avLst/>
+          </a:prstGeom>
+          <a:noFill/>
+        </p:spPr>
+        <p:txBody>
+          <a:bodyPr wrap="none" rtlCol="0">
+            <a:spAutoFit/>
+          </a:bodyPr>
+          <a:lstStyle/>
+          <a:p>
+            <a:r>
+              <a:rPr lang="es-ES_tradnl" dirty="0"/>
+              <a:t>Administraciones públicas</a:t>
+            </a:r>
+            <a:r>
+              <a:rPr lang="en-GB" dirty="0"/>
+              <a:t> (</a:t>
+            </a:r>
+            <a:r>
+              <a:rPr lang="en-GB" dirty="0" err="1"/>
+              <a:t>regulaciones</a:t>
+            </a:r>
+            <a:r>
+              <a:rPr lang="en-GB" dirty="0"/>
+              <a:t>)</a:t>
+            </a:r>
+          </a:p>
+        </p:txBody>
+      </p:sp>
+      <p:sp>
+        <p:nvSpPr>
+          <p:cNvPr id="5" name="TextBox 4">
+            <a:extLst>
+              <a:ext uri="{FF2B5EF4-FFF2-40B4-BE49-F238E27FC236}">
+                <a16:creationId xmlns:a16="http://schemas.microsoft.com/office/drawing/2014/main" id="{8D8995CE-C03B-5777-9A81-FC42D1B45C5B}"/>
+              </a:ext>
+            </a:extLst>
+          </p:cNvPr>
+          <p:cNvSpPr txBox="1"/>
+          <p:nvPr/>
+        </p:nvSpPr>
+        <p:spPr>
+          <a:xfrm>
+            <a:off x="5190762" y="1031432"/>
+            <a:ext cx="1616533" cy="646331"/>
+          </a:xfrm>
+          <a:prstGeom prst="rect">
+            <a:avLst/>
+          </a:prstGeom>
+          <a:noFill/>
+        </p:spPr>
+        <p:txBody>
+          <a:bodyPr wrap="none" rtlCol="0">
+            <a:spAutoFit/>
+          </a:bodyPr>
+          <a:lstStyle/>
+          <a:p>
+            <a:r>
+              <a:rPr lang="es-ES_tradnl" dirty="0" err="1"/>
+              <a:t>Early</a:t>
+            </a:r>
+            <a:r>
+              <a:rPr lang="es-ES_tradnl" dirty="0"/>
+              <a:t> </a:t>
+            </a:r>
+            <a:r>
+              <a:rPr lang="es-ES_tradnl" dirty="0" err="1"/>
+              <a:t>adopters</a:t>
+            </a:r>
+            <a:endParaRPr lang="es-ES_tradnl" dirty="0"/>
+          </a:p>
+          <a:p>
+            <a:endParaRPr lang="es-ES_tradnl" dirty="0"/>
+          </a:p>
+        </p:txBody>
+      </p:sp>
+      <p:sp>
+        <p:nvSpPr>
+          <p:cNvPr id="6" name="TextBox 5">
+            <a:extLst>
+              <a:ext uri="{FF2B5EF4-FFF2-40B4-BE49-F238E27FC236}">
+                <a16:creationId xmlns:a16="http://schemas.microsoft.com/office/drawing/2014/main" id="{DCF6C220-3785-27C9-BF27-5F2D8DB403AA}"/>
+              </a:ext>
+            </a:extLst>
+          </p:cNvPr>
+          <p:cNvSpPr txBox="1"/>
+          <p:nvPr/>
+        </p:nvSpPr>
+        <p:spPr>
+          <a:xfrm>
+            <a:off x="8526680" y="1804743"/>
+            <a:ext cx="3484984" cy="646331"/>
+          </a:xfrm>
+          <a:prstGeom prst="rect">
+            <a:avLst/>
+          </a:prstGeom>
+          <a:noFill/>
+        </p:spPr>
+        <p:txBody>
+          <a:bodyPr wrap="square" rtlCol="0">
+            <a:spAutoFit/>
+          </a:bodyPr>
+          <a:lstStyle/>
+          <a:p>
+            <a:r>
+              <a:rPr lang="es-ES_tradnl" dirty="0"/>
+              <a:t>Fabricantes de componentes específicos</a:t>
+            </a:r>
+            <a:endParaRPr lang="en-GB" dirty="0"/>
+          </a:p>
+        </p:txBody>
+      </p:sp>
+      <p:sp>
+        <p:nvSpPr>
+          <p:cNvPr id="7" name="TextBox 6">
+            <a:extLst>
+              <a:ext uri="{FF2B5EF4-FFF2-40B4-BE49-F238E27FC236}">
+                <a16:creationId xmlns:a16="http://schemas.microsoft.com/office/drawing/2014/main" id="{9BA588B3-3164-9035-84BA-3DFB8536D01D}"/>
+              </a:ext>
+            </a:extLst>
+          </p:cNvPr>
+          <p:cNvSpPr txBox="1"/>
+          <p:nvPr/>
+        </p:nvSpPr>
+        <p:spPr>
+          <a:xfrm>
+            <a:off x="3934761" y="3429000"/>
+            <a:ext cx="2721771" cy="369332"/>
+          </a:xfrm>
+          <a:prstGeom prst="rect">
+            <a:avLst/>
+          </a:prstGeom>
+          <a:noFill/>
+        </p:spPr>
+        <p:txBody>
+          <a:bodyPr wrap="none" rtlCol="0">
+            <a:spAutoFit/>
+          </a:bodyPr>
+          <a:lstStyle/>
+          <a:p>
+            <a:r>
+              <a:rPr lang="es-ES_tradnl" dirty="0"/>
+              <a:t>Curiosos, público general</a:t>
+            </a:r>
+          </a:p>
+        </p:txBody>
+      </p:sp>
+      <p:sp>
+        <p:nvSpPr>
+          <p:cNvPr id="8" name="TextBox 7">
+            <a:extLst>
+              <a:ext uri="{FF2B5EF4-FFF2-40B4-BE49-F238E27FC236}">
+                <a16:creationId xmlns:a16="http://schemas.microsoft.com/office/drawing/2014/main" id="{276BDC69-E56C-7F7C-BE2A-0D6B911B86BA}"/>
+              </a:ext>
+            </a:extLst>
+          </p:cNvPr>
+          <p:cNvSpPr txBox="1"/>
+          <p:nvPr/>
+        </p:nvSpPr>
+        <p:spPr>
+          <a:xfrm>
+            <a:off x="8526680" y="4099887"/>
+            <a:ext cx="3484984" cy="646331"/>
+          </a:xfrm>
+          <a:prstGeom prst="rect">
+            <a:avLst/>
+          </a:prstGeom>
+          <a:noFill/>
+        </p:spPr>
+        <p:txBody>
+          <a:bodyPr wrap="square" rtlCol="0">
+            <a:spAutoFit/>
+          </a:bodyPr>
+          <a:lstStyle/>
+          <a:p>
+            <a:r>
+              <a:rPr lang="es-ES_tradnl" dirty="0"/>
+              <a:t>Fabricantes de componentes generales (mucho volumen)</a:t>
+            </a:r>
+            <a:endParaRPr lang="en-GB" dirty="0"/>
+          </a:p>
+        </p:txBody>
+      </p:sp>
+      <p:sp>
+        <p:nvSpPr>
+          <p:cNvPr id="9" name="TextBox 8">
+            <a:extLst>
+              <a:ext uri="{FF2B5EF4-FFF2-40B4-BE49-F238E27FC236}">
+                <a16:creationId xmlns:a16="http://schemas.microsoft.com/office/drawing/2014/main" id="{810CF5DC-0FF7-C715-93C8-399FDC0368DA}"/>
+              </a:ext>
+            </a:extLst>
+          </p:cNvPr>
+          <p:cNvSpPr txBox="1"/>
+          <p:nvPr/>
+        </p:nvSpPr>
+        <p:spPr>
+          <a:xfrm>
+            <a:off x="8693853" y="3444770"/>
+            <a:ext cx="2829453" cy="369332"/>
+          </a:xfrm>
+          <a:prstGeom prst="rect">
+            <a:avLst/>
+          </a:prstGeom>
+          <a:noFill/>
+        </p:spPr>
+        <p:txBody>
+          <a:bodyPr wrap="square" rtlCol="0">
+            <a:spAutoFit/>
+          </a:bodyPr>
+          <a:lstStyle/>
+          <a:p>
+            <a:pPr marL="0" algn="l" rtl="0" eaLnBrk="1" latinLnBrk="0" hangingPunct="1"/>
+            <a:r>
+              <a:rPr lang="en-GB" sz="1800" kern="1200" dirty="0" err="1">
+                <a:solidFill>
+                  <a:srgbClr val="000000"/>
+                </a:solidFill>
+                <a:effectLst/>
+                <a:latin typeface="Aptos" panose="020B0004020202020204" pitchFamily="34" charset="0"/>
+                <a:ea typeface="+mn-ea"/>
+                <a:cs typeface="+mn-cs"/>
+              </a:rPr>
+              <a:t>Distribuidores</a:t>
+            </a:r>
+            <a:r>
+              <a:rPr lang="en-GB" sz="1800" kern="1200" dirty="0">
+                <a:solidFill>
+                  <a:srgbClr val="000000"/>
+                </a:solidFill>
+                <a:effectLst/>
+                <a:latin typeface="Aptos" panose="020B0004020202020204" pitchFamily="34" charset="0"/>
+                <a:ea typeface="+mn-ea"/>
+                <a:cs typeface="+mn-cs"/>
+              </a:rPr>
+              <a:t> y tiendas</a:t>
+            </a:r>
+            <a:endParaRPr lang="en-GB" dirty="0">
+              <a:effectLst/>
+            </a:endParaRPr>
+          </a:p>
+        </p:txBody>
+      </p:sp>
+      <p:sp>
+        <p:nvSpPr>
+          <p:cNvPr id="10" name="TextBox 9">
+            <a:extLst>
+              <a:ext uri="{FF2B5EF4-FFF2-40B4-BE49-F238E27FC236}">
+                <a16:creationId xmlns:a16="http://schemas.microsoft.com/office/drawing/2014/main" id="{07FA8446-C98D-63F3-D389-46477C704849}"/>
+              </a:ext>
+            </a:extLst>
+          </p:cNvPr>
+          <p:cNvSpPr txBox="1"/>
+          <p:nvPr/>
+        </p:nvSpPr>
+        <p:spPr>
+          <a:xfrm>
+            <a:off x="7820706" y="5389228"/>
+            <a:ext cx="3598164" cy="369332"/>
+          </a:xfrm>
+          <a:prstGeom prst="rect">
+            <a:avLst/>
+          </a:prstGeom>
+          <a:noFill/>
+        </p:spPr>
+        <p:txBody>
+          <a:bodyPr wrap="none" rtlCol="0">
+            <a:spAutoFit/>
+          </a:bodyPr>
+          <a:lstStyle/>
+          <a:p>
+            <a:r>
+              <a:rPr lang="es-ES_tradnl" dirty="0"/>
+              <a:t>Competencia directa (fabricantes)</a:t>
+            </a:r>
+          </a:p>
+        </p:txBody>
+      </p:sp>
     </p:spTree>
     <p:extLst>
       <p:ext uri="{BB962C8B-B14F-4D97-AF65-F5344CB8AC3E}">
@@ -7388,15 +8714,6 @@
 </file>
 
 <file path=customXml/item1.xml><?xml version="1.0" encoding="utf-8"?>
-<?mso-contentType ?>
-<FormTemplates xmlns="http://schemas.microsoft.com/sharepoint/v3/contenttype/forms">
-  <Display>DocumentLibraryForm</Display>
-  <Edit>DocumentLibraryForm</Edit>
-  <New>DocumentLibraryForm</New>
-</FormTemplates>
-</file>
-
-<file path=customXml/item2.xml><?xml version="1.0" encoding="utf-8"?>
 <p:properties xmlns:p="http://schemas.microsoft.com/office/2006/metadata/properties" xmlns:xsi="http://www.w3.org/2001/XMLSchema-instance" xmlns:pc="http://schemas.microsoft.com/office/infopath/2007/PartnerControls">
   <documentManagement>
     <lcf76f155ced4ddcb4097134ff3c332f xmlns="8894590a-63d3-477f-ae9c-2ee6b1ed86ab">
@@ -7407,7 +8724,7 @@
 </p:properties>
 </file>
 
-<file path=customXml/item3.xml><?xml version="1.0" encoding="utf-8"?>
+<file path=customXml/item2.xml><?xml version="1.0" encoding="utf-8"?>
 <ct:contentTypeSchema xmlns:ct="http://schemas.microsoft.com/office/2006/metadata/contentType" xmlns:ma="http://schemas.microsoft.com/office/2006/metadata/properties/metaAttributes" ct:_="" ma:_="" ma:contentTypeName="Documento" ma:contentTypeID="0x0101000F296FF6DB4C134FB8B4909F877D1D9B" ma:contentTypeVersion="13" ma:contentTypeDescription="Crear nuevo documento." ma:contentTypeScope="" ma:versionID="79875dd09396de32a35a0e42943aa9f8">
   <xsd:schema xmlns:xsd="http://www.w3.org/2001/XMLSchema" xmlns:xs="http://www.w3.org/2001/XMLSchema" xmlns:p="http://schemas.microsoft.com/office/2006/metadata/properties" xmlns:ns2="fb21810a-d3fa-4548-b058-2287e88bcdc2" xmlns:ns3="8894590a-63d3-477f-ae9c-2ee6b1ed86ab" targetNamespace="http://schemas.microsoft.com/office/2006/metadata/properties" ma:root="true" ma:fieldsID="a53b57dba4ed0605b03bfce32ba9ed01" ns2:_="" ns3:_="">
     <xsd:import namespace="fb21810a-d3fa-4548-b058-2287e88bcdc2"/>
@@ -7630,15 +8947,16 @@
 </ct:contentTypeSchema>
 </file>
 
-<file path=customXml/itemProps1.xml><?xml version="1.0" encoding="utf-8"?>
-<ds:datastoreItem xmlns:ds="http://schemas.openxmlformats.org/officeDocument/2006/customXml" ds:itemID="{4C0C676C-2848-42E0-9CB7-98110D95193E}">
-  <ds:schemaRefs>
-    <ds:schemaRef ds:uri="http://schemas.microsoft.com/sharepoint/v3/contenttype/forms"/>
-  </ds:schemaRefs>
-</ds:datastoreItem>
+<file path=customXml/item3.xml><?xml version="1.0" encoding="utf-8"?>
+<?mso-contentType ?>
+<FormTemplates xmlns="http://schemas.microsoft.com/sharepoint/v3/contenttype/forms">
+  <Display>DocumentLibraryForm</Display>
+  <Edit>DocumentLibraryForm</Edit>
+  <New>DocumentLibraryForm</New>
+</FormTemplates>
 </file>
 
-<file path=customXml/itemProps2.xml><?xml version="1.0" encoding="utf-8"?>
+<file path=customXml/itemProps1.xml><?xml version="1.0" encoding="utf-8"?>
 <ds:datastoreItem xmlns:ds="http://schemas.openxmlformats.org/officeDocument/2006/customXml" ds:itemID="{27D8B443-0B9E-47BD-AA8D-413ED483696F}">
   <ds:schemaRefs>
     <ds:schemaRef ds:uri="http://schemas.microsoft.com/office/2006/metadata/properties"/>
@@ -7649,7 +8967,7 @@
 </ds:datastoreItem>
 </file>
 
-<file path=customXml/itemProps3.xml><?xml version="1.0" encoding="utf-8"?>
+<file path=customXml/itemProps2.xml><?xml version="1.0" encoding="utf-8"?>
 <ds:datastoreItem xmlns:ds="http://schemas.openxmlformats.org/officeDocument/2006/customXml" ds:itemID="{C009E48A-2689-4948-B176-09B8FB323772}">
   <ds:schemaRefs>
     <ds:schemaRef ds:uri="http://schemas.microsoft.com/office/2006/metadata/contentType"/>
@@ -7666,4 +8984,12 @@
     <ds:schemaRef ds:uri="http://schemas.microsoft.com/internal/obd"/>
   </ds:schemaRefs>
 </ds:datastoreItem>
+</file>
+
+<file path=customXml/itemProps3.xml><?xml version="1.0" encoding="utf-8"?>
+<ds:datastoreItem xmlns:ds="http://schemas.openxmlformats.org/officeDocument/2006/customXml" ds:itemID="{4C0C676C-2848-42E0-9CB7-98110D95193E}">
+  <ds:schemaRefs>
+    <ds:schemaRef ds:uri="http://schemas.microsoft.com/sharepoint/v3/contenttype/forms"/>
+  </ds:schemaRefs>
+</ds:datastoreItem>
 </file>
</xml_diff>